<commit_message>
Adding map of zips in NYC by therapist density
</commit_message>
<xml_diff>
--- a/2_Processing/NYC Psychotherapists.pptx
+++ b/2_Processing/NYC Psychotherapists.pptx
@@ -5,10 +5,10 @@
     <p:sldMasterId id="2147483648" r:id="rId4"/>
   </p:sldMasterIdLst>
   <p:notesMasterIdLst>
-    <p:notesMasterId r:id="rId46"/>
+    <p:notesMasterId r:id="rId47"/>
   </p:notesMasterIdLst>
   <p:handoutMasterIdLst>
-    <p:handoutMasterId r:id="rId47"/>
+    <p:handoutMasterId r:id="rId48"/>
   </p:handoutMasterIdLst>
   <p:sldIdLst>
     <p:sldId id="256" r:id="rId5"/>
@@ -48,10 +48,11 @@
     <p:sldId id="306" r:id="rId39"/>
     <p:sldId id="307" r:id="rId40"/>
     <p:sldId id="310" r:id="rId41"/>
-    <p:sldId id="311" r:id="rId42"/>
-    <p:sldId id="312" r:id="rId43"/>
-    <p:sldId id="313" r:id="rId44"/>
-    <p:sldId id="268" r:id="rId45"/>
+    <p:sldId id="314" r:id="rId42"/>
+    <p:sldId id="311" r:id="rId43"/>
+    <p:sldId id="312" r:id="rId44"/>
+    <p:sldId id="313" r:id="rId45"/>
+    <p:sldId id="268" r:id="rId46"/>
   </p:sldIdLst>
   <p:sldSz cx="9144000" cy="5143500" type="screen16x9"/>
   <p:notesSz cx="6797675" cy="9926638"/>
@@ -196,6 +197,7 @@
             <p14:sldId id="306"/>
             <p14:sldId id="307"/>
             <p14:sldId id="310"/>
+            <p14:sldId id="314"/>
             <p14:sldId id="311"/>
             <p14:sldId id="312"/>
             <p14:sldId id="313"/>
@@ -1227,7 +1229,7 @@
                   <a:schemeClr val="bg2"/>
                 </a:solidFill>
               </a:rPr>
-              <a:t>41</a:t>
+              <a:t>42</a:t>
             </a:fld>
             <a:endParaRPr lang="en-US" sz="800" dirty="0">
               <a:solidFill>
@@ -14618,52 +14620,7 @@
                 </a:solidFill>
                 <a:latin typeface="Arial" pitchFamily="34" charset="0"/>
               </a:rPr>
-              <a:t>© GfK </a:t>
-            </a:r>
-            <a:r>
-              <a:rPr lang="en-US" sz="800" noProof="0" dirty="0" smtClean="0">
-                <a:solidFill>
-                  <a:schemeClr val="bg2"/>
-                </a:solidFill>
-                <a:latin typeface="Arial" pitchFamily="34" charset="0"/>
-              </a:rPr>
-              <a:t>2017 </a:t>
-            </a:r>
-            <a:r>
-              <a:rPr lang="en-US" sz="800" noProof="0" dirty="0" smtClean="0">
-                <a:solidFill>
-                  <a:schemeClr val="bg2"/>
-                </a:solidFill>
-                <a:latin typeface="Arial" pitchFamily="34" charset="0"/>
-              </a:rPr>
-              <a:t>| </a:t>
-            </a:r>
-            <a:r>
-              <a:rPr lang="en-US" sz="800" noProof="0" dirty="0" smtClean="0">
-                <a:solidFill>
-                  <a:schemeClr val="bg2"/>
-                </a:solidFill>
-                <a:latin typeface="Arial" pitchFamily="34" charset="0"/>
-              </a:rPr>
-              <a:t>Psychotherapists of New York City </a:t>
-            </a:r>
-            <a:r>
-              <a:rPr lang="en-US" sz="800" noProof="0" dirty="0" smtClean="0">
-                <a:solidFill>
-                  <a:schemeClr val="bg2"/>
-                </a:solidFill>
-                <a:latin typeface="Arial" pitchFamily="34" charset="0"/>
-              </a:rPr>
-              <a:t>| </a:t>
-            </a:r>
-            <a:r>
-              <a:rPr lang="en-US" sz="800" noProof="0" dirty="0" smtClean="0">
-                <a:solidFill>
-                  <a:schemeClr val="bg2"/>
-                </a:solidFill>
-                <a:latin typeface="Arial" pitchFamily="34" charset="0"/>
-              </a:rPr>
-              <a:t>October</a:t>
+              <a:t>© GfK 2017 | Psychotherapists of New York City | October</a:t>
             </a:r>
             <a:r>
               <a:rPr lang="en-US" sz="800" baseline="0" noProof="0" dirty="0" smtClean="0">
@@ -14683,12 +14640,6 @@
               </a:rPr>
               <a:t>2017</a:t>
             </a:r>
-            <a:endParaRPr lang="en-US" sz="800" noProof="0" dirty="0" smtClean="0">
-              <a:solidFill>
-                <a:schemeClr val="bg2"/>
-              </a:solidFill>
-              <a:latin typeface="Arial" pitchFamily="34" charset="0"/>
-            </a:endParaRPr>
           </a:p>
         </p:txBody>
       </p:sp>
@@ -15452,7 +15403,6 @@
               <a:rPr lang="en-US" sz="1600" dirty="0" smtClean="0"/>
               <a:t>NYU is in the lead</a:t>
             </a:r>
-            <a:endParaRPr lang="en-US" sz="1600" dirty="0" smtClean="0"/>
           </a:p>
           <a:p>
             <a:pPr marL="285750" indent="-285750">
@@ -15858,17 +15808,7 @@
                 <a:latin typeface="Arial" pitchFamily="34" charset="0"/>
                 <a:cs typeface="Arial" pitchFamily="34" charset="0"/>
               </a:rPr>
-              <a:t>32</a:t>
-            </a:r>
-            <a:r>
-              <a:rPr lang="en-US" sz="1000" dirty="0" smtClean="0">
-                <a:solidFill>
-                  <a:srgbClr val="FF0000"/>
-                </a:solidFill>
-                <a:latin typeface="Arial" pitchFamily="34" charset="0"/>
-                <a:cs typeface="Arial" pitchFamily="34" charset="0"/>
-              </a:rPr>
-              <a:t>%</a:t>
+              <a:t>32%</a:t>
             </a:r>
             <a:endParaRPr lang="en-US" dirty="0" smtClean="0">
               <a:solidFill>
@@ -15990,17 +15930,7 @@
                 <a:latin typeface="Arial" pitchFamily="34" charset="0"/>
                 <a:cs typeface="Arial" pitchFamily="34" charset="0"/>
               </a:rPr>
-              <a:t>64</a:t>
-            </a:r>
-            <a:r>
-              <a:rPr lang="en-US" sz="1000" dirty="0" smtClean="0">
-                <a:solidFill>
-                  <a:srgbClr val="FF0000"/>
-                </a:solidFill>
-                <a:latin typeface="Arial" pitchFamily="34" charset="0"/>
-                <a:cs typeface="Arial" pitchFamily="34" charset="0"/>
-              </a:rPr>
-              <a:t>%</a:t>
+              <a:t>64%</a:t>
             </a:r>
             <a:endParaRPr lang="en-US" dirty="0" smtClean="0">
               <a:solidFill>
@@ -16290,17 +16220,7 @@
                 <a:latin typeface="Arial" pitchFamily="34" charset="0"/>
                 <a:cs typeface="Arial" pitchFamily="34" charset="0"/>
               </a:rPr>
-              <a:t>17.5</a:t>
-            </a:r>
-            <a:r>
-              <a:rPr lang="en-US" sz="1000" dirty="0" smtClean="0">
-                <a:solidFill>
-                  <a:srgbClr val="FF0000"/>
-                </a:solidFill>
-                <a:latin typeface="Arial" pitchFamily="34" charset="0"/>
-                <a:cs typeface="Arial" pitchFamily="34" charset="0"/>
-              </a:rPr>
-              <a:t>%</a:t>
+              <a:t>17.5%</a:t>
             </a:r>
             <a:endParaRPr lang="en-US" dirty="0" smtClean="0">
               <a:solidFill>
@@ -17012,7 +16932,6 @@
               <a:rPr lang="en-US" sz="1600" dirty="0" smtClean="0"/>
               <a:t>No explanation for  weird spikes around 11,17, 25 and 37 years in practice.</a:t>
             </a:r>
-            <a:endParaRPr lang="en-US" sz="1600" dirty="0" smtClean="0"/>
           </a:p>
         </p:txBody>
       </p:sp>
@@ -17405,7 +17324,6 @@
               <a:rPr lang="en-US" sz="1400" dirty="0" smtClean="0"/>
               <a:t>Most of non-NY state licenses are from NJ, followed by Connecticut</a:t>
             </a:r>
-            <a:endParaRPr lang="en-US" sz="1400" dirty="0" smtClean="0"/>
           </a:p>
         </p:txBody>
       </p:sp>
@@ -20011,16 +19929,7 @@
                 </a:solidFill>
                 <a:latin typeface="Arial" pitchFamily="34" charset="0"/>
               </a:rPr>
-              <a:t>What </a:t>
-            </a:r>
-            <a:r>
-              <a:rPr lang="en-US" sz="1400" dirty="0" smtClean="0">
-                <a:solidFill>
-                  <a:schemeClr val="bg1"/>
-                </a:solidFill>
-                <a:latin typeface="Arial" pitchFamily="34" charset="0"/>
-              </a:rPr>
-              <a:t>patient</a:t>
+              <a:t>What patient</a:t>
             </a:r>
           </a:p>
           <a:p>
@@ -20919,7 +20828,6 @@
               <a:rPr lang="en-US" sz="1400" dirty="0" smtClean="0"/>
               <a:t>Maybe median income per zip code also has an impact?</a:t>
             </a:r>
-            <a:endParaRPr lang="en-US" sz="1400" dirty="0" smtClean="0"/>
           </a:p>
         </p:txBody>
       </p:sp>
@@ -20960,17 +20868,7 @@
                 <a:latin typeface="Arial" pitchFamily="34" charset="0"/>
                 <a:cs typeface="Arial" pitchFamily="34" charset="0"/>
               </a:rPr>
-              <a:t>Eac</a:t>
-            </a:r>
-            <a:r>
-              <a:rPr lang="en-US" sz="1050" dirty="0" smtClean="0">
-                <a:solidFill>
-                  <a:srgbClr val="FF0000"/>
-                </a:solidFill>
-                <a:latin typeface="Arial" pitchFamily="34" charset="0"/>
-                <a:cs typeface="Arial" pitchFamily="34" charset="0"/>
-              </a:rPr>
-              <a:t>h dot is one zip code</a:t>
+              <a:t>Each dot is one zip code</a:t>
             </a:r>
             <a:endParaRPr lang="en-US" sz="2000" dirty="0" smtClean="0">
               <a:solidFill>
@@ -21121,17 +21019,7 @@
                 <a:latin typeface="Arial" pitchFamily="34" charset="0"/>
                 <a:cs typeface="Arial" pitchFamily="34" charset="0"/>
               </a:rPr>
-              <a:t>Eac</a:t>
-            </a:r>
-            <a:r>
-              <a:rPr lang="en-US" sz="1050" dirty="0" smtClean="0">
-                <a:solidFill>
-                  <a:srgbClr val="FF0000"/>
-                </a:solidFill>
-                <a:latin typeface="Arial" pitchFamily="34" charset="0"/>
-                <a:cs typeface="Arial" pitchFamily="34" charset="0"/>
-              </a:rPr>
-              <a:t>h dot is one zip code</a:t>
+              <a:t>Each dot is one zip code</a:t>
             </a:r>
             <a:endParaRPr lang="en-US" sz="2000" dirty="0" smtClean="0">
               <a:solidFill>
@@ -21524,7 +21412,6 @@
               <a:rPr lang="en-US" sz="1400" dirty="0" smtClean="0"/>
               <a:t>Clearly, both population size AND income impact the number of therapists.</a:t>
             </a:r>
-            <a:endParaRPr lang="en-US" sz="1400" dirty="0" smtClean="0"/>
           </a:p>
         </p:txBody>
       </p:sp>
@@ -21565,17 +21452,7 @@
                 <a:latin typeface="Arial" pitchFamily="34" charset="0"/>
                 <a:cs typeface="Arial" pitchFamily="34" charset="0"/>
               </a:rPr>
-              <a:t>Eac</a:t>
-            </a:r>
-            <a:r>
-              <a:rPr lang="en-US" sz="1050" dirty="0" smtClean="0">
-                <a:solidFill>
-                  <a:srgbClr val="FF0000"/>
-                </a:solidFill>
-                <a:latin typeface="Arial" pitchFamily="34" charset="0"/>
-                <a:cs typeface="Arial" pitchFamily="34" charset="0"/>
-              </a:rPr>
-              <a:t>h dot is one zip code</a:t>
+              <a:t>Each dot is one zip code</a:t>
             </a:r>
             <a:endParaRPr lang="en-US" sz="2000" dirty="0" smtClean="0">
               <a:solidFill>
@@ -22011,17 +21888,7 @@
                 <a:latin typeface="Arial" pitchFamily="34" charset="0"/>
                 <a:cs typeface="Arial" pitchFamily="34" charset="0"/>
               </a:rPr>
-              <a:t>Eac</a:t>
-            </a:r>
-            <a:r>
-              <a:rPr lang="en-US" sz="1050" dirty="0" smtClean="0">
-                <a:solidFill>
-                  <a:srgbClr val="FF0000"/>
-                </a:solidFill>
-                <a:latin typeface="Arial" pitchFamily="34" charset="0"/>
-                <a:cs typeface="Arial" pitchFamily="34" charset="0"/>
-              </a:rPr>
-              <a:t>h dot is one zip code</a:t>
+              <a:t>Each dot is one zip code</a:t>
             </a:r>
             <a:endParaRPr lang="en-US" sz="2000" dirty="0" smtClean="0">
               <a:solidFill>
@@ -22427,17 +22294,7 @@
                 <a:latin typeface="Arial" pitchFamily="34" charset="0"/>
                 <a:cs typeface="Arial" pitchFamily="34" charset="0"/>
               </a:rPr>
-              <a:t>Eac</a:t>
-            </a:r>
-            <a:r>
-              <a:rPr lang="en-US" sz="1050" dirty="0" smtClean="0">
-                <a:solidFill>
-                  <a:srgbClr val="FF0000"/>
-                </a:solidFill>
-                <a:latin typeface="Arial" pitchFamily="34" charset="0"/>
-                <a:cs typeface="Arial" pitchFamily="34" charset="0"/>
-              </a:rPr>
-              <a:t>h dot is one zip code</a:t>
+              <a:t>Each dot is one zip code</a:t>
             </a:r>
             <a:endParaRPr lang="en-US" sz="2000" dirty="0" smtClean="0">
               <a:solidFill>
@@ -22463,6 +22320,112 @@
 </file>
 
 <file path=ppt/slides/slide38.xml><?xml version="1.0" encoding="utf-8"?>
+<p:sld xmlns:a="http://schemas.openxmlformats.org/drawingml/2006/main" xmlns:r="http://schemas.openxmlformats.org/officeDocument/2006/relationships" xmlns:p="http://schemas.openxmlformats.org/presentationml/2006/main">
+  <p:cSld>
+    <p:spTree>
+      <p:nvGrpSpPr>
+        <p:cNvPr id="1" name=""/>
+        <p:cNvGrpSpPr/>
+        <p:nvPr/>
+      </p:nvGrpSpPr>
+      <p:grpSpPr>
+        <a:xfrm>
+          <a:off x="0" y="0"/>
+          <a:ext cx="0" cy="0"/>
+          <a:chOff x="0" y="0"/>
+          <a:chExt cx="0" cy="0"/>
+        </a:xfrm>
+      </p:grpSpPr>
+      <p:sp>
+        <p:nvSpPr>
+          <p:cNvPr id="2" name="Title 1"/>
+          <p:cNvSpPr>
+            <a:spLocks noGrp="1"/>
+          </p:cNvSpPr>
+          <p:nvPr>
+            <p:ph type="title"/>
+          </p:nvPr>
+        </p:nvSpPr>
+        <p:spPr/>
+        <p:txBody>
+          <a:bodyPr/>
+          <a:lstStyle/>
+          <a:p>
+            <a:r>
+              <a:rPr lang="en-US" dirty="0" smtClean="0"/>
+              <a:t>Map of “therapist density” in NYC by </a:t>
+            </a:r>
+            <a:r>
+              <a:rPr lang="en-US" dirty="0" err="1" smtClean="0"/>
+              <a:t>zipcode</a:t>
+            </a:r>
+            <a:endParaRPr lang="en-US" dirty="0"/>
+          </a:p>
+        </p:txBody>
+      </p:sp>
+      <p:sp>
+        <p:nvSpPr>
+          <p:cNvPr id="3" name="Text Placeholder 2"/>
+          <p:cNvSpPr>
+            <a:spLocks noGrp="1"/>
+          </p:cNvSpPr>
+          <p:nvPr>
+            <p:ph type="body" sz="quarter" idx="12"/>
+          </p:nvPr>
+        </p:nvSpPr>
+        <p:spPr/>
+        <p:txBody>
+          <a:bodyPr/>
+          <a:lstStyle/>
+          <a:p>
+            <a:endParaRPr lang="en-US"/>
+          </a:p>
+        </p:txBody>
+      </p:sp>
+      <p:pic>
+        <p:nvPicPr>
+          <p:cNvPr id="4" name="Picture 3"/>
+          <p:cNvPicPr>
+            <a:picLocks noChangeAspect="1"/>
+          </p:cNvPicPr>
+          <p:nvPr/>
+        </p:nvPicPr>
+        <p:blipFill>
+          <a:blip r:embed="rId2">
+            <a:extLst>
+              <a:ext uri="{28A0092B-C50C-407E-A947-70E740481C1C}">
+                <a14:useLocalDpi xmlns:a14="http://schemas.microsoft.com/office/drawing/2010/main" val="0"/>
+              </a:ext>
+            </a:extLst>
+          </a:blip>
+          <a:stretch>
+            <a:fillRect/>
+          </a:stretch>
+        </p:blipFill>
+        <p:spPr>
+          <a:xfrm>
+            <a:off x="326835" y="971550"/>
+            <a:ext cx="7910709" cy="3962070"/>
+          </a:xfrm>
+          <a:prstGeom prst="rect">
+            <a:avLst/>
+          </a:prstGeom>
+        </p:spPr>
+      </p:pic>
+    </p:spTree>
+    <p:extLst>
+      <p:ext uri="{BB962C8B-B14F-4D97-AF65-F5344CB8AC3E}">
+        <p14:creationId xmlns:p14="http://schemas.microsoft.com/office/powerpoint/2010/main" val="2245328400"/>
+      </p:ext>
+    </p:extLst>
+  </p:cSld>
+  <p:clrMapOvr>
+    <a:masterClrMapping/>
+  </p:clrMapOvr>
+</p:sld>
+</file>
+
+<file path=ppt/slides/slide39.xml><?xml version="1.0" encoding="utf-8"?>
 <p:sld xmlns:a="http://schemas.openxmlformats.org/drawingml/2006/main" xmlns:r="http://schemas.openxmlformats.org/officeDocument/2006/relationships" xmlns:p="http://schemas.openxmlformats.org/presentationml/2006/main">
   <p:cSld>
     <p:spTree>
@@ -22819,363 +22782,6 @@
 </p:sld>
 </file>
 
-<file path=ppt/slides/slide39.xml><?xml version="1.0" encoding="utf-8"?>
-<p:sld xmlns:a="http://schemas.openxmlformats.org/drawingml/2006/main" xmlns:r="http://schemas.openxmlformats.org/officeDocument/2006/relationships" xmlns:p="http://schemas.openxmlformats.org/presentationml/2006/main">
-  <p:cSld>
-    <p:spTree>
-      <p:nvGrpSpPr>
-        <p:cNvPr id="1" name=""/>
-        <p:cNvGrpSpPr/>
-        <p:nvPr/>
-      </p:nvGrpSpPr>
-      <p:grpSpPr>
-        <a:xfrm>
-          <a:off x="0" y="0"/>
-          <a:ext cx="0" cy="0"/>
-          <a:chOff x="0" y="0"/>
-          <a:chExt cx="0" cy="0"/>
-        </a:xfrm>
-      </p:grpSpPr>
-      <p:sp>
-        <p:nvSpPr>
-          <p:cNvPr id="2" name="Title 1"/>
-          <p:cNvSpPr>
-            <a:spLocks noGrp="1"/>
-          </p:cNvSpPr>
-          <p:nvPr>
-            <p:ph type="title"/>
-          </p:nvPr>
-        </p:nvSpPr>
-        <p:spPr/>
-        <p:txBody>
-          <a:bodyPr/>
-          <a:lstStyle/>
-          <a:p>
-            <a:r>
-              <a:rPr lang="en-US" dirty="0" smtClean="0"/>
-              <a:t>Zip codes with the lowest “density” of therapists</a:t>
-            </a:r>
-            <a:endParaRPr lang="en-US" dirty="0"/>
-          </a:p>
-        </p:txBody>
-      </p:sp>
-      <p:sp>
-        <p:nvSpPr>
-          <p:cNvPr id="3" name="Text Placeholder 2"/>
-          <p:cNvSpPr>
-            <a:spLocks noGrp="1"/>
-          </p:cNvSpPr>
-          <p:nvPr>
-            <p:ph type="body" sz="quarter" idx="12"/>
-          </p:nvPr>
-        </p:nvSpPr>
-        <p:spPr/>
-        <p:txBody>
-          <a:bodyPr/>
-          <a:lstStyle/>
-          <a:p>
-            <a:endParaRPr lang="en-US"/>
-          </a:p>
-        </p:txBody>
-      </p:sp>
-      <p:sp>
-        <p:nvSpPr>
-          <p:cNvPr id="5" name="Content Placeholder 2"/>
-          <p:cNvSpPr txBox="1">
-            <a:spLocks/>
-          </p:cNvSpPr>
-          <p:nvPr/>
-        </p:nvSpPr>
-        <p:spPr bwMode="gray">
-          <a:xfrm>
-            <a:off x="5943600" y="1308249"/>
-            <a:ext cx="2819400" cy="2590800"/>
-          </a:xfrm>
-          <a:prstGeom prst="rect">
-            <a:avLst/>
-          </a:prstGeom>
-        </p:spPr>
-        <p:txBody>
-          <a:bodyPr vert="horz" lIns="0" tIns="18000" rIns="0" bIns="0" rtlCol="0" anchor="t" anchorCtr="0">
-            <a:noAutofit/>
-          </a:bodyPr>
-          <a:lstStyle>
-            <a:lvl1pPr marL="0" marR="0" indent="0" algn="l" defTabSz="914400" rtl="0" eaLnBrk="1" fontAlgn="auto" latinLnBrk="0" hangingPunct="1">
-              <a:lnSpc>
-                <a:spcPct val="100000"/>
-              </a:lnSpc>
-              <a:spcBef>
-                <a:spcPts val="600"/>
-              </a:spcBef>
-              <a:spcAft>
-                <a:spcPts val="0"/>
-              </a:spcAft>
-              <a:buClrTx/>
-              <a:buSzTx/>
-              <a:buFont typeface="Arial" pitchFamily="34" charset="0"/>
-              <a:buNone/>
-              <a:tabLst/>
-              <a:defRPr sz="1800" kern="1200">
-                <a:solidFill>
-                  <a:schemeClr val="tx2"/>
-                </a:solidFill>
-                <a:latin typeface="Arial" pitchFamily="34" charset="0"/>
-                <a:ea typeface="+mn-ea"/>
-                <a:cs typeface="Arial" pitchFamily="34" charset="0"/>
-              </a:defRPr>
-            </a:lvl1pPr>
-            <a:lvl2pPr marL="0" marR="0" indent="0" algn="l" defTabSz="914400" rtl="0" eaLnBrk="1" fontAlgn="auto" latinLnBrk="0" hangingPunct="1">
-              <a:lnSpc>
-                <a:spcPct val="100000"/>
-              </a:lnSpc>
-              <a:spcBef>
-                <a:spcPts val="600"/>
-              </a:spcBef>
-              <a:spcAft>
-                <a:spcPts val="0"/>
-              </a:spcAft>
-              <a:buClrTx/>
-              <a:buSzTx/>
-              <a:buFont typeface="Arial" pitchFamily="34" charset="0"/>
-              <a:buNone/>
-              <a:tabLst/>
-              <a:defRPr sz="1600" kern="1200">
-                <a:solidFill>
-                  <a:schemeClr val="tx1"/>
-                </a:solidFill>
-                <a:latin typeface="Arial" pitchFamily="34" charset="0"/>
-                <a:ea typeface="+mn-ea"/>
-                <a:cs typeface="Arial" pitchFamily="34" charset="0"/>
-              </a:defRPr>
-            </a:lvl2pPr>
-            <a:lvl3pPr marL="180975" marR="0" indent="-180975" algn="l" defTabSz="914400" rtl="0" eaLnBrk="1" fontAlgn="auto" latinLnBrk="0" hangingPunct="1">
-              <a:lnSpc>
-                <a:spcPct val="100000"/>
-              </a:lnSpc>
-              <a:spcBef>
-                <a:spcPts val="300"/>
-              </a:spcBef>
-              <a:spcAft>
-                <a:spcPts val="0"/>
-              </a:spcAft>
-              <a:buClrTx/>
-              <a:buSzTx/>
-              <a:buFont typeface="Arial" pitchFamily="34" charset="0"/>
-              <a:buChar char="•"/>
-              <a:tabLst/>
-              <a:defRPr sz="1600" kern="1200">
-                <a:solidFill>
-                  <a:schemeClr val="tx1"/>
-                </a:solidFill>
-                <a:latin typeface="Arial" pitchFamily="34" charset="0"/>
-                <a:ea typeface="+mn-ea"/>
-                <a:cs typeface="Arial" pitchFamily="34" charset="0"/>
-              </a:defRPr>
-            </a:lvl3pPr>
-            <a:lvl4pPr marL="360000" marR="0" indent="-180975" algn="l" defTabSz="914400" rtl="0" eaLnBrk="1" fontAlgn="auto" latinLnBrk="0" hangingPunct="1">
-              <a:lnSpc>
-                <a:spcPct val="100000"/>
-              </a:lnSpc>
-              <a:spcBef>
-                <a:spcPts val="300"/>
-              </a:spcBef>
-              <a:spcAft>
-                <a:spcPts val="0"/>
-              </a:spcAft>
-              <a:buClrTx/>
-              <a:buSzTx/>
-              <a:buFont typeface="Arial" pitchFamily="34" charset="0"/>
-              <a:buChar char="•"/>
-              <a:tabLst/>
-              <a:defRPr sz="1600" kern="1200">
-                <a:solidFill>
-                  <a:schemeClr val="tx1"/>
-                </a:solidFill>
-                <a:latin typeface="Arial" pitchFamily="34" charset="0"/>
-                <a:ea typeface="+mn-ea"/>
-                <a:cs typeface="Arial" pitchFamily="34" charset="0"/>
-              </a:defRPr>
-            </a:lvl4pPr>
-            <a:lvl5pPr marL="540000" marR="0" indent="-180975" algn="l" defTabSz="914400" rtl="0" eaLnBrk="1" fontAlgn="auto" latinLnBrk="0" hangingPunct="1">
-              <a:lnSpc>
-                <a:spcPct val="100000"/>
-              </a:lnSpc>
-              <a:spcBef>
-                <a:spcPts val="300"/>
-              </a:spcBef>
-              <a:spcAft>
-                <a:spcPts val="0"/>
-              </a:spcAft>
-              <a:buClrTx/>
-              <a:buSzTx/>
-              <a:buFont typeface="Arial" pitchFamily="34" charset="0"/>
-              <a:buChar char="•"/>
-              <a:tabLst/>
-              <a:defRPr sz="1600" kern="1200">
-                <a:solidFill>
-                  <a:schemeClr val="tx1"/>
-                </a:solidFill>
-                <a:latin typeface="Arial" pitchFamily="34" charset="0"/>
-                <a:ea typeface="+mn-ea"/>
-                <a:cs typeface="Arial" pitchFamily="34" charset="0"/>
-              </a:defRPr>
-            </a:lvl5pPr>
-            <a:lvl6pPr marL="540000" marR="0" indent="-180975" algn="l" defTabSz="914400" rtl="0" eaLnBrk="1" fontAlgn="auto" latinLnBrk="0" hangingPunct="1">
-              <a:lnSpc>
-                <a:spcPct val="100000"/>
-              </a:lnSpc>
-              <a:spcBef>
-                <a:spcPts val="300"/>
-              </a:spcBef>
-              <a:spcAft>
-                <a:spcPts val="0"/>
-              </a:spcAft>
-              <a:buClrTx/>
-              <a:buSzTx/>
-              <a:buFont typeface="Arial" pitchFamily="34" charset="0"/>
-              <a:buChar char="•"/>
-              <a:tabLst/>
-              <a:defRPr sz="1600" kern="1200">
-                <a:solidFill>
-                  <a:schemeClr val="tx1"/>
-                </a:solidFill>
-                <a:latin typeface="Arial" pitchFamily="34" charset="0"/>
-                <a:ea typeface="+mn-ea"/>
-                <a:cs typeface="Arial" pitchFamily="34" charset="0"/>
-              </a:defRPr>
-            </a:lvl6pPr>
-            <a:lvl7pPr marL="540000" marR="0" indent="-180975" algn="l" defTabSz="914400" rtl="0" eaLnBrk="1" fontAlgn="auto" latinLnBrk="0" hangingPunct="1">
-              <a:lnSpc>
-                <a:spcPct val="100000"/>
-              </a:lnSpc>
-              <a:spcBef>
-                <a:spcPts val="300"/>
-              </a:spcBef>
-              <a:spcAft>
-                <a:spcPts val="0"/>
-              </a:spcAft>
-              <a:buClrTx/>
-              <a:buSzTx/>
-              <a:buFont typeface="Arial" pitchFamily="34" charset="0"/>
-              <a:buChar char="•"/>
-              <a:tabLst/>
-              <a:defRPr sz="1600" kern="1200">
-                <a:solidFill>
-                  <a:schemeClr val="tx1"/>
-                </a:solidFill>
-                <a:latin typeface="Arial" pitchFamily="34" charset="0"/>
-                <a:ea typeface="+mn-ea"/>
-                <a:cs typeface="Arial" pitchFamily="34" charset="0"/>
-              </a:defRPr>
-            </a:lvl7pPr>
-            <a:lvl8pPr marL="540000" indent="-180000" algn="l" defTabSz="914400" rtl="0" eaLnBrk="1" latinLnBrk="0" hangingPunct="1">
-              <a:spcBef>
-                <a:spcPts val="300"/>
-              </a:spcBef>
-              <a:spcAft>
-                <a:spcPts val="0"/>
-              </a:spcAft>
-              <a:buFont typeface="Arial" pitchFamily="34" charset="0"/>
-              <a:buChar char="•"/>
-              <a:defRPr sz="1600" kern="1200">
-                <a:solidFill>
-                  <a:schemeClr val="tx1"/>
-                </a:solidFill>
-                <a:latin typeface="Arial" pitchFamily="34" charset="0"/>
-                <a:ea typeface="+mn-ea"/>
-                <a:cs typeface="Arial" pitchFamily="34" charset="0"/>
-              </a:defRPr>
-            </a:lvl8pPr>
-            <a:lvl9pPr marL="540000" marR="0" indent="-180975" algn="l" defTabSz="914400" rtl="0" eaLnBrk="1" fontAlgn="auto" latinLnBrk="0" hangingPunct="1">
-              <a:lnSpc>
-                <a:spcPct val="100000"/>
-              </a:lnSpc>
-              <a:spcBef>
-                <a:spcPts val="300"/>
-              </a:spcBef>
-              <a:spcAft>
-                <a:spcPts val="0"/>
-              </a:spcAft>
-              <a:buClrTx/>
-              <a:buSzTx/>
-              <a:buFont typeface="Arial" pitchFamily="34" charset="0"/>
-              <a:buChar char="•"/>
-              <a:tabLst/>
-              <a:defRPr sz="1600" kern="1200">
-                <a:solidFill>
-                  <a:schemeClr val="tx1"/>
-                </a:solidFill>
-                <a:latin typeface="Arial" pitchFamily="34" charset="0"/>
-                <a:ea typeface="+mn-ea"/>
-                <a:cs typeface="Arial" pitchFamily="34" charset="0"/>
-              </a:defRPr>
-            </a:lvl9pPr>
-          </a:lstStyle>
-          <a:p>
-            <a:pPr marL="285750" indent="-285750">
-              <a:buFont typeface="Arial" pitchFamily="34" charset="0"/>
-              <a:buChar char="•"/>
-            </a:pPr>
-            <a:r>
-              <a:rPr lang="en-US" sz="1400" dirty="0" smtClean="0"/>
-              <a:t>“Density” = number of therapists per 1000 households</a:t>
-            </a:r>
-          </a:p>
-          <a:p>
-            <a:pPr marL="285750" indent="-285750">
-              <a:buFont typeface="Arial" pitchFamily="34" charset="0"/>
-              <a:buChar char="•"/>
-            </a:pPr>
-            <a:r>
-              <a:rPr lang="en-US" sz="1400" dirty="0" smtClean="0"/>
-              <a:t>All these top zip codes are the poorest neighborhoods – and they are outside Manhattan.</a:t>
-            </a:r>
-          </a:p>
-        </p:txBody>
-      </p:sp>
-      <p:pic>
-        <p:nvPicPr>
-          <p:cNvPr id="6" name="Picture 5"/>
-          <p:cNvPicPr>
-            <a:picLocks noChangeAspect="1"/>
-          </p:cNvPicPr>
-          <p:nvPr/>
-        </p:nvPicPr>
-        <p:blipFill>
-          <a:blip r:embed="rId2">
-            <a:extLst>
-              <a:ext uri="{28A0092B-C50C-407E-A947-70E740481C1C}">
-                <a14:useLocalDpi xmlns:a14="http://schemas.microsoft.com/office/drawing/2010/main" val="0"/>
-              </a:ext>
-            </a:extLst>
-          </a:blip>
-          <a:stretch>
-            <a:fillRect/>
-          </a:stretch>
-        </p:blipFill>
-        <p:spPr>
-          <a:xfrm>
-            <a:off x="318684" y="971551"/>
-            <a:ext cx="5597264" cy="3983666"/>
-          </a:xfrm>
-          <a:prstGeom prst="rect">
-            <a:avLst/>
-          </a:prstGeom>
-        </p:spPr>
-      </p:pic>
-    </p:spTree>
-    <p:extLst>
-      <p:ext uri="{BB962C8B-B14F-4D97-AF65-F5344CB8AC3E}">
-        <p14:creationId xmlns:p14="http://schemas.microsoft.com/office/powerpoint/2010/main" val="3751405854"/>
-      </p:ext>
-    </p:extLst>
-  </p:cSld>
-  <p:clrMapOvr>
-    <a:masterClrMapping/>
-  </p:clrMapOvr>
-</p:sld>
-</file>
-
 <file path=ppt/slides/slide4.xml><?xml version="1.0" encoding="utf-8"?>
 <p:sld xmlns:a="http://schemas.openxmlformats.org/drawingml/2006/main" xmlns:r="http://schemas.openxmlformats.org/officeDocument/2006/relationships" xmlns:p="http://schemas.openxmlformats.org/presentationml/2006/main">
   <p:cSld>
@@ -23269,10 +22875,6 @@
               </a:rPr>
               <a:t>Psychology Today’s “Find a therapist” website is the premium self-advertising platform for psychotherapists.</a:t>
             </a:r>
-            <a:endParaRPr lang="en-US" dirty="0" smtClean="0">
-              <a:latin typeface="Arial" pitchFamily="34" charset="0"/>
-              <a:cs typeface="Arial" pitchFamily="34" charset="0"/>
-            </a:endParaRPr>
           </a:p>
         </p:txBody>
       </p:sp>
@@ -23377,6 +22979,363 @@
           <a:p>
             <a:r>
               <a:rPr lang="en-US" dirty="0" smtClean="0"/>
+              <a:t>Zip codes with the lowest “density” of therapists</a:t>
+            </a:r>
+            <a:endParaRPr lang="en-US" dirty="0"/>
+          </a:p>
+        </p:txBody>
+      </p:sp>
+      <p:sp>
+        <p:nvSpPr>
+          <p:cNvPr id="3" name="Text Placeholder 2"/>
+          <p:cNvSpPr>
+            <a:spLocks noGrp="1"/>
+          </p:cNvSpPr>
+          <p:nvPr>
+            <p:ph type="body" sz="quarter" idx="12"/>
+          </p:nvPr>
+        </p:nvSpPr>
+        <p:spPr/>
+        <p:txBody>
+          <a:bodyPr/>
+          <a:lstStyle/>
+          <a:p>
+            <a:endParaRPr lang="en-US"/>
+          </a:p>
+        </p:txBody>
+      </p:sp>
+      <p:sp>
+        <p:nvSpPr>
+          <p:cNvPr id="5" name="Content Placeholder 2"/>
+          <p:cNvSpPr txBox="1">
+            <a:spLocks/>
+          </p:cNvSpPr>
+          <p:nvPr/>
+        </p:nvSpPr>
+        <p:spPr bwMode="gray">
+          <a:xfrm>
+            <a:off x="5943600" y="1308249"/>
+            <a:ext cx="2819400" cy="2590800"/>
+          </a:xfrm>
+          <a:prstGeom prst="rect">
+            <a:avLst/>
+          </a:prstGeom>
+        </p:spPr>
+        <p:txBody>
+          <a:bodyPr vert="horz" lIns="0" tIns="18000" rIns="0" bIns="0" rtlCol="0" anchor="t" anchorCtr="0">
+            <a:noAutofit/>
+          </a:bodyPr>
+          <a:lstStyle>
+            <a:lvl1pPr marL="0" marR="0" indent="0" algn="l" defTabSz="914400" rtl="0" eaLnBrk="1" fontAlgn="auto" latinLnBrk="0" hangingPunct="1">
+              <a:lnSpc>
+                <a:spcPct val="100000"/>
+              </a:lnSpc>
+              <a:spcBef>
+                <a:spcPts val="600"/>
+              </a:spcBef>
+              <a:spcAft>
+                <a:spcPts val="0"/>
+              </a:spcAft>
+              <a:buClrTx/>
+              <a:buSzTx/>
+              <a:buFont typeface="Arial" pitchFamily="34" charset="0"/>
+              <a:buNone/>
+              <a:tabLst/>
+              <a:defRPr sz="1800" kern="1200">
+                <a:solidFill>
+                  <a:schemeClr val="tx2"/>
+                </a:solidFill>
+                <a:latin typeface="Arial" pitchFamily="34" charset="0"/>
+                <a:ea typeface="+mn-ea"/>
+                <a:cs typeface="Arial" pitchFamily="34" charset="0"/>
+              </a:defRPr>
+            </a:lvl1pPr>
+            <a:lvl2pPr marL="0" marR="0" indent="0" algn="l" defTabSz="914400" rtl="0" eaLnBrk="1" fontAlgn="auto" latinLnBrk="0" hangingPunct="1">
+              <a:lnSpc>
+                <a:spcPct val="100000"/>
+              </a:lnSpc>
+              <a:spcBef>
+                <a:spcPts val="600"/>
+              </a:spcBef>
+              <a:spcAft>
+                <a:spcPts val="0"/>
+              </a:spcAft>
+              <a:buClrTx/>
+              <a:buSzTx/>
+              <a:buFont typeface="Arial" pitchFamily="34" charset="0"/>
+              <a:buNone/>
+              <a:tabLst/>
+              <a:defRPr sz="1600" kern="1200">
+                <a:solidFill>
+                  <a:schemeClr val="tx1"/>
+                </a:solidFill>
+                <a:latin typeface="Arial" pitchFamily="34" charset="0"/>
+                <a:ea typeface="+mn-ea"/>
+                <a:cs typeface="Arial" pitchFamily="34" charset="0"/>
+              </a:defRPr>
+            </a:lvl2pPr>
+            <a:lvl3pPr marL="180975" marR="0" indent="-180975" algn="l" defTabSz="914400" rtl="0" eaLnBrk="1" fontAlgn="auto" latinLnBrk="0" hangingPunct="1">
+              <a:lnSpc>
+                <a:spcPct val="100000"/>
+              </a:lnSpc>
+              <a:spcBef>
+                <a:spcPts val="300"/>
+              </a:spcBef>
+              <a:spcAft>
+                <a:spcPts val="0"/>
+              </a:spcAft>
+              <a:buClrTx/>
+              <a:buSzTx/>
+              <a:buFont typeface="Arial" pitchFamily="34" charset="0"/>
+              <a:buChar char="•"/>
+              <a:tabLst/>
+              <a:defRPr sz="1600" kern="1200">
+                <a:solidFill>
+                  <a:schemeClr val="tx1"/>
+                </a:solidFill>
+                <a:latin typeface="Arial" pitchFamily="34" charset="0"/>
+                <a:ea typeface="+mn-ea"/>
+                <a:cs typeface="Arial" pitchFamily="34" charset="0"/>
+              </a:defRPr>
+            </a:lvl3pPr>
+            <a:lvl4pPr marL="360000" marR="0" indent="-180975" algn="l" defTabSz="914400" rtl="0" eaLnBrk="1" fontAlgn="auto" latinLnBrk="0" hangingPunct="1">
+              <a:lnSpc>
+                <a:spcPct val="100000"/>
+              </a:lnSpc>
+              <a:spcBef>
+                <a:spcPts val="300"/>
+              </a:spcBef>
+              <a:spcAft>
+                <a:spcPts val="0"/>
+              </a:spcAft>
+              <a:buClrTx/>
+              <a:buSzTx/>
+              <a:buFont typeface="Arial" pitchFamily="34" charset="0"/>
+              <a:buChar char="•"/>
+              <a:tabLst/>
+              <a:defRPr sz="1600" kern="1200">
+                <a:solidFill>
+                  <a:schemeClr val="tx1"/>
+                </a:solidFill>
+                <a:latin typeface="Arial" pitchFamily="34" charset="0"/>
+                <a:ea typeface="+mn-ea"/>
+                <a:cs typeface="Arial" pitchFamily="34" charset="0"/>
+              </a:defRPr>
+            </a:lvl4pPr>
+            <a:lvl5pPr marL="540000" marR="0" indent="-180975" algn="l" defTabSz="914400" rtl="0" eaLnBrk="1" fontAlgn="auto" latinLnBrk="0" hangingPunct="1">
+              <a:lnSpc>
+                <a:spcPct val="100000"/>
+              </a:lnSpc>
+              <a:spcBef>
+                <a:spcPts val="300"/>
+              </a:spcBef>
+              <a:spcAft>
+                <a:spcPts val="0"/>
+              </a:spcAft>
+              <a:buClrTx/>
+              <a:buSzTx/>
+              <a:buFont typeface="Arial" pitchFamily="34" charset="0"/>
+              <a:buChar char="•"/>
+              <a:tabLst/>
+              <a:defRPr sz="1600" kern="1200">
+                <a:solidFill>
+                  <a:schemeClr val="tx1"/>
+                </a:solidFill>
+                <a:latin typeface="Arial" pitchFamily="34" charset="0"/>
+                <a:ea typeface="+mn-ea"/>
+                <a:cs typeface="Arial" pitchFamily="34" charset="0"/>
+              </a:defRPr>
+            </a:lvl5pPr>
+            <a:lvl6pPr marL="540000" marR="0" indent="-180975" algn="l" defTabSz="914400" rtl="0" eaLnBrk="1" fontAlgn="auto" latinLnBrk="0" hangingPunct="1">
+              <a:lnSpc>
+                <a:spcPct val="100000"/>
+              </a:lnSpc>
+              <a:spcBef>
+                <a:spcPts val="300"/>
+              </a:spcBef>
+              <a:spcAft>
+                <a:spcPts val="0"/>
+              </a:spcAft>
+              <a:buClrTx/>
+              <a:buSzTx/>
+              <a:buFont typeface="Arial" pitchFamily="34" charset="0"/>
+              <a:buChar char="•"/>
+              <a:tabLst/>
+              <a:defRPr sz="1600" kern="1200">
+                <a:solidFill>
+                  <a:schemeClr val="tx1"/>
+                </a:solidFill>
+                <a:latin typeface="Arial" pitchFamily="34" charset="0"/>
+                <a:ea typeface="+mn-ea"/>
+                <a:cs typeface="Arial" pitchFamily="34" charset="0"/>
+              </a:defRPr>
+            </a:lvl6pPr>
+            <a:lvl7pPr marL="540000" marR="0" indent="-180975" algn="l" defTabSz="914400" rtl="0" eaLnBrk="1" fontAlgn="auto" latinLnBrk="0" hangingPunct="1">
+              <a:lnSpc>
+                <a:spcPct val="100000"/>
+              </a:lnSpc>
+              <a:spcBef>
+                <a:spcPts val="300"/>
+              </a:spcBef>
+              <a:spcAft>
+                <a:spcPts val="0"/>
+              </a:spcAft>
+              <a:buClrTx/>
+              <a:buSzTx/>
+              <a:buFont typeface="Arial" pitchFamily="34" charset="0"/>
+              <a:buChar char="•"/>
+              <a:tabLst/>
+              <a:defRPr sz="1600" kern="1200">
+                <a:solidFill>
+                  <a:schemeClr val="tx1"/>
+                </a:solidFill>
+                <a:latin typeface="Arial" pitchFamily="34" charset="0"/>
+                <a:ea typeface="+mn-ea"/>
+                <a:cs typeface="Arial" pitchFamily="34" charset="0"/>
+              </a:defRPr>
+            </a:lvl7pPr>
+            <a:lvl8pPr marL="540000" indent="-180000" algn="l" defTabSz="914400" rtl="0" eaLnBrk="1" latinLnBrk="0" hangingPunct="1">
+              <a:spcBef>
+                <a:spcPts val="300"/>
+              </a:spcBef>
+              <a:spcAft>
+                <a:spcPts val="0"/>
+              </a:spcAft>
+              <a:buFont typeface="Arial" pitchFamily="34" charset="0"/>
+              <a:buChar char="•"/>
+              <a:defRPr sz="1600" kern="1200">
+                <a:solidFill>
+                  <a:schemeClr val="tx1"/>
+                </a:solidFill>
+                <a:latin typeface="Arial" pitchFamily="34" charset="0"/>
+                <a:ea typeface="+mn-ea"/>
+                <a:cs typeface="Arial" pitchFamily="34" charset="0"/>
+              </a:defRPr>
+            </a:lvl8pPr>
+            <a:lvl9pPr marL="540000" marR="0" indent="-180975" algn="l" defTabSz="914400" rtl="0" eaLnBrk="1" fontAlgn="auto" latinLnBrk="0" hangingPunct="1">
+              <a:lnSpc>
+                <a:spcPct val="100000"/>
+              </a:lnSpc>
+              <a:spcBef>
+                <a:spcPts val="300"/>
+              </a:spcBef>
+              <a:spcAft>
+                <a:spcPts val="0"/>
+              </a:spcAft>
+              <a:buClrTx/>
+              <a:buSzTx/>
+              <a:buFont typeface="Arial" pitchFamily="34" charset="0"/>
+              <a:buChar char="•"/>
+              <a:tabLst/>
+              <a:defRPr sz="1600" kern="1200">
+                <a:solidFill>
+                  <a:schemeClr val="tx1"/>
+                </a:solidFill>
+                <a:latin typeface="Arial" pitchFamily="34" charset="0"/>
+                <a:ea typeface="+mn-ea"/>
+                <a:cs typeface="Arial" pitchFamily="34" charset="0"/>
+              </a:defRPr>
+            </a:lvl9pPr>
+          </a:lstStyle>
+          <a:p>
+            <a:pPr marL="285750" indent="-285750">
+              <a:buFont typeface="Arial" pitchFamily="34" charset="0"/>
+              <a:buChar char="•"/>
+            </a:pPr>
+            <a:r>
+              <a:rPr lang="en-US" sz="1400" dirty="0" smtClean="0"/>
+              <a:t>“Density” = number of therapists per 1000 households</a:t>
+            </a:r>
+          </a:p>
+          <a:p>
+            <a:pPr marL="285750" indent="-285750">
+              <a:buFont typeface="Arial" pitchFamily="34" charset="0"/>
+              <a:buChar char="•"/>
+            </a:pPr>
+            <a:r>
+              <a:rPr lang="en-US" sz="1400" dirty="0" smtClean="0"/>
+              <a:t>All these top zip codes are the poorest neighborhoods – and they are outside Manhattan.</a:t>
+            </a:r>
+          </a:p>
+        </p:txBody>
+      </p:sp>
+      <p:pic>
+        <p:nvPicPr>
+          <p:cNvPr id="6" name="Picture 5"/>
+          <p:cNvPicPr>
+            <a:picLocks noChangeAspect="1"/>
+          </p:cNvPicPr>
+          <p:nvPr/>
+        </p:nvPicPr>
+        <p:blipFill>
+          <a:blip r:embed="rId2">
+            <a:extLst>
+              <a:ext uri="{28A0092B-C50C-407E-A947-70E740481C1C}">
+                <a14:useLocalDpi xmlns:a14="http://schemas.microsoft.com/office/drawing/2010/main" val="0"/>
+              </a:ext>
+            </a:extLst>
+          </a:blip>
+          <a:stretch>
+            <a:fillRect/>
+          </a:stretch>
+        </p:blipFill>
+        <p:spPr>
+          <a:xfrm>
+            <a:off x="318684" y="971551"/>
+            <a:ext cx="5597264" cy="3983666"/>
+          </a:xfrm>
+          <a:prstGeom prst="rect">
+            <a:avLst/>
+          </a:prstGeom>
+        </p:spPr>
+      </p:pic>
+    </p:spTree>
+    <p:extLst>
+      <p:ext uri="{BB962C8B-B14F-4D97-AF65-F5344CB8AC3E}">
+        <p14:creationId xmlns:p14="http://schemas.microsoft.com/office/powerpoint/2010/main" val="3751405854"/>
+      </p:ext>
+    </p:extLst>
+  </p:cSld>
+  <p:clrMapOvr>
+    <a:masterClrMapping/>
+  </p:clrMapOvr>
+</p:sld>
+</file>
+
+<file path=ppt/slides/slide41.xml><?xml version="1.0" encoding="utf-8"?>
+<p:sld xmlns:a="http://schemas.openxmlformats.org/drawingml/2006/main" xmlns:r="http://schemas.openxmlformats.org/officeDocument/2006/relationships" xmlns:p="http://schemas.openxmlformats.org/presentationml/2006/main">
+  <p:cSld>
+    <p:spTree>
+      <p:nvGrpSpPr>
+        <p:cNvPr id="1" name=""/>
+        <p:cNvGrpSpPr/>
+        <p:nvPr/>
+      </p:nvGrpSpPr>
+      <p:grpSpPr>
+        <a:xfrm>
+          <a:off x="0" y="0"/>
+          <a:ext cx="0" cy="0"/>
+          <a:chOff x="0" y="0"/>
+          <a:chExt cx="0" cy="0"/>
+        </a:xfrm>
+      </p:grpSpPr>
+      <p:sp>
+        <p:nvSpPr>
+          <p:cNvPr id="2" name="Title 1"/>
+          <p:cNvSpPr>
+            <a:spLocks noGrp="1"/>
+          </p:cNvSpPr>
+          <p:nvPr>
+            <p:ph type="title"/>
+          </p:nvPr>
+        </p:nvSpPr>
+        <p:spPr/>
+        <p:txBody>
+          <a:bodyPr/>
+          <a:lstStyle/>
+          <a:p>
+            <a:r>
+              <a:rPr lang="en-US" dirty="0" smtClean="0"/>
               <a:t>Further insights can be gained from the data set</a:t>
             </a:r>
             <a:endParaRPr lang="en-US" dirty="0"/>
@@ -23491,7 +23450,7 @@
 </p:sld>
 </file>
 
-<file path=ppt/slides/slide41.xml><?xml version="1.0" encoding="utf-8"?>
+<file path=ppt/slides/slide42.xml><?xml version="1.0" encoding="utf-8"?>
 <p:sld xmlns:a="http://schemas.openxmlformats.org/drawingml/2006/main" xmlns:r="http://schemas.openxmlformats.org/officeDocument/2006/relationships" xmlns:p="http://schemas.openxmlformats.org/presentationml/2006/main">
   <p:cSld>
     <p:spTree>
@@ -25693,87 +25652,6 @@
 </file>
 
 <file path=customXml/item1.xml><?xml version="1.0" encoding="utf-8"?>
-<p:properties xmlns:p="http://schemas.microsoft.com/office/2006/metadata/properties" xmlns:xsi="http://www.w3.org/2001/XMLSchema-instance" xmlns:pc="http://schemas.microsoft.com/office/infopath/2007/PartnerControls">
-  <documentManagement>
-    <PublishingExpirationDate xmlns="http://schemas.microsoft.com/sharepoint/v3" xsi:nil="true"/>
-    <AverageRating xmlns="http://schemas.microsoft.com/sharepoint/v3" xsi:nil="true"/>
-    <PublishingStartDate xmlns="http://schemas.microsoft.com/sharepoint/v3" xsi:nil="true"/>
-    <TaxCatchAll xmlns="eaa6d935-851e-4683-8fb3-4830ef9470e6">
-      <Value>64</Value>
-      <Value>69</Value>
-      <Value>57</Value>
-      <Value>97</Value>
-      <Value>68</Value>
-      <Value>73</Value>
-    </TaxCatchAll>
-    <TaxKeywordTaxHTField xmlns="eaa6d935-851e-4683-8fb3-4830ef9470e6">
-      <Terms xmlns="http://schemas.microsoft.com/office/infopath/2007/PartnerControls"/>
-    </TaxKeywordTaxHTField>
-    <p986eefbff5f4b2788134fa6982c2730 xmlns="fdaf2857-34a0-4271-9efd-53feeda81814">
-      <Terms xmlns="http://schemas.microsoft.com/office/infopath/2007/PartnerControls">
-        <TermInfo xmlns="http://schemas.microsoft.com/office/infopath/2007/PartnerControls">
-          <TermName xmlns="http://schemas.microsoft.com/office/infopath/2007/PartnerControls">Not applicable</TermName>
-          <TermId xmlns="http://schemas.microsoft.com/office/infopath/2007/PartnerControls">15480a47-f0f1-4795-a643-bf3b2e95805c</TermId>
-        </TermInfo>
-      </Terms>
-    </p986eefbff5f4b2788134fa6982c2730>
-    <m0c14ac2d9c042e3be8883c9fd5ef198 xmlns="fdaf2857-34a0-4271-9efd-53feeda81814">
-      <Terms xmlns="http://schemas.microsoft.com/office/infopath/2007/PartnerControls">
-        <TermInfo xmlns="http://schemas.microsoft.com/office/infopath/2007/PartnerControls">
-          <TermName xmlns="http://schemas.microsoft.com/office/infopath/2007/PartnerControls">English</TermName>
-          <TermId xmlns="http://schemas.microsoft.com/office/infopath/2007/PartnerControls">914398da-6a81-430b-8d1c-6a7bd1227f71</TermId>
-        </TermInfo>
-      </Terms>
-    </m0c14ac2d9c042e3be8883c9fd5ef198>
-    <a9556e1ac9ee423090b285ae20260b00 xmlns="fdaf2857-34a0-4271-9efd-53feeda81814">
-      <Terms xmlns="http://schemas.microsoft.com/office/infopath/2007/PartnerControls">
-        <TermInfo xmlns="http://schemas.microsoft.com/office/infopath/2007/PartnerControls">
-          <TermName xmlns="http://schemas.microsoft.com/office/infopath/2007/PartnerControls">Cross Sector</TermName>
-          <TermId xmlns="http://schemas.microsoft.com/office/infopath/2007/PartnerControls">d51dcd69-a6f7-4fb6-bc11-144a9da6fd82</TermId>
-        </TermInfo>
-      </Terms>
-    </a9556e1ac9ee423090b285ae20260b00>
-    <h059eda5e5c344e5901eabd9b8ae1d5d xmlns="fdaf2857-34a0-4271-9efd-53feeda81814">
-      <Terms xmlns="http://schemas.microsoft.com/office/infopath/2007/PartnerControls">
-        <TermInfo xmlns="http://schemas.microsoft.com/office/infopath/2007/PartnerControls">
-          <TermName xmlns="http://schemas.microsoft.com/office/infopath/2007/PartnerControls">Not applicable</TermName>
-          <TermId xmlns="http://schemas.microsoft.com/office/infopath/2007/PartnerControls">1b0d69d1-6137-41de-9ae5-e5925610d8cb</TermId>
-        </TermInfo>
-      </Terms>
-    </h059eda5e5c344e5901eabd9b8ae1d5d>
-    <e999b8edfbce4772b22c3a8c74ff36ce xmlns="fdaf2857-34a0-4271-9efd-53feeda81814">
-      <Terms xmlns="http://schemas.microsoft.com/office/infopath/2007/PartnerControls"/>
-    </e999b8edfbce4772b22c3a8c74ff36ce>
-    <i6d89d2a22ad4b4885b9858a4f35747a xmlns="fdaf2857-34a0-4271-9efd-53feeda81814">
-      <Terms xmlns="http://schemas.microsoft.com/office/infopath/2007/PartnerControls">
-        <TermInfo xmlns="http://schemas.microsoft.com/office/infopath/2007/PartnerControls">
-          <TermName xmlns="http://schemas.microsoft.com/office/infopath/2007/PartnerControls">Global</TermName>
-          <TermId xmlns="http://schemas.microsoft.com/office/infopath/2007/PartnerControls">3eaca359-c4b3-4b51-a927-e9852da92384</TermId>
-        </TermInfo>
-      </Terms>
-    </i6d89d2a22ad4b4885b9858a4f35747a>
-    <jf0640f97dcd40049d3fc8c3d10ff855 xmlns="fdaf2857-34a0-4271-9efd-53feeda81814">
-      <Terms xmlns="http://schemas.microsoft.com/office/infopath/2007/PartnerControls">
-        <TermInfo xmlns="http://schemas.microsoft.com/office/infopath/2007/PartnerControls">
-          <TermName xmlns="http://schemas.microsoft.com/office/infopath/2007/PartnerControls">Not applicable</TermName>
-          <TermId xmlns="http://schemas.microsoft.com/office/infopath/2007/PartnerControls">457da623-78f9-49de-8564-b1618c49ba59</TermId>
-        </TermInfo>
-      </Terms>
-    </jf0640f97dcd40049d3fc8c3d10ff855>
-  </documentManagement>
-</p:properties>
-</file>
-
-<file path=customXml/item2.xml><?xml version="1.0" encoding="utf-8"?>
-<?mso-contentType ?>
-<FormTemplates xmlns="http://schemas.microsoft.com/sharepoint/v3/contenttype/forms">
-  <Display>DocumentLibraryForm</Display>
-  <Edit>DocumentLibraryForm</Edit>
-  <New>DocumentLibraryForm</New>
-</FormTemplates>
-</file>
-
-<file path=customXml/item3.xml><?xml version="1.0" encoding="utf-8"?>
 <ct:contentTypeSchema xmlns:ct="http://schemas.microsoft.com/office/2006/metadata/contentType" xmlns:ma="http://schemas.microsoft.com/office/2006/metadata/properties/metaAttributes" ct:_="" ma:_="" ma:contentTypeName="Document" ma:contentTypeID="0x010100D9151DFF91B0A44197B29C020F8C642F" ma:contentTypeVersion="44" ma:contentTypeDescription="Create a new document." ma:contentTypeScope="" ma:versionID="37d6c69e0f0b1eab2d91fd3d2fe12a06">
   <xsd:schema xmlns:xsd="http://www.w3.org/2001/XMLSchema" xmlns:xs="http://www.w3.org/2001/XMLSchema" xmlns:p="http://schemas.microsoft.com/office/2006/metadata/properties" xmlns:ns1="http://schemas.microsoft.com/sharepoint/v3" xmlns:ns2="fdaf2857-34a0-4271-9efd-53feeda81814" xmlns:ns3="eaa6d935-851e-4683-8fb3-4830ef9470e6" targetNamespace="http://schemas.microsoft.com/office/2006/metadata/properties" ma:root="true" ma:fieldsID="306287739f13a793c1a58b147bf45c68" ns1:_="" ns2:_="" ns3:_="">
     <xsd:import namespace="http://schemas.microsoft.com/sharepoint/v3"/>
@@ -26015,33 +25893,88 @@
 </ct:contentTypeSchema>
 </file>
 
-<file path=customXml/itemProps1.xml><?xml version="1.0" encoding="utf-8"?>
-<ds:datastoreItem xmlns:ds="http://schemas.openxmlformats.org/officeDocument/2006/customXml" ds:itemID="{34AB0903-C811-4386-89A0-517F35E2B28C}">
-  <ds:schemaRefs>
-    <ds:schemaRef ds:uri="http://schemas.microsoft.com/office/2006/metadata/properties"/>
-    <ds:schemaRef ds:uri="http://purl.org/dc/elements/1.1/"/>
-    <ds:schemaRef ds:uri="fdaf2857-34a0-4271-9efd-53feeda81814"/>
-    <ds:schemaRef ds:uri="http://www.w3.org/XML/1998/namespace"/>
-    <ds:schemaRef ds:uri="http://schemas.microsoft.com/office/2006/documentManagement/types"/>
-    <ds:schemaRef ds:uri="http://purl.org/dc/terms/"/>
-    <ds:schemaRef ds:uri="http://purl.org/dc/dcmitype/"/>
-    <ds:schemaRef ds:uri="http://schemas.microsoft.com/sharepoint/v3"/>
-    <ds:schemaRef ds:uri="http://schemas.microsoft.com/office/infopath/2007/PartnerControls"/>
-    <ds:schemaRef ds:uri="http://schemas.openxmlformats.org/package/2006/metadata/core-properties"/>
-    <ds:schemaRef ds:uri="eaa6d935-851e-4683-8fb3-4830ef9470e6"/>
-  </ds:schemaRefs>
-</ds:datastoreItem>
+<file path=customXml/item2.xml><?xml version="1.0" encoding="utf-8"?>
+<?mso-contentType ?>
+<FormTemplates xmlns="http://schemas.microsoft.com/sharepoint/v3/contenttype/forms">
+  <Display>DocumentLibraryForm</Display>
+  <Edit>DocumentLibraryForm</Edit>
+  <New>DocumentLibraryForm</New>
+</FormTemplates>
 </file>
 
-<file path=customXml/itemProps2.xml><?xml version="1.0" encoding="utf-8"?>
-<ds:datastoreItem xmlns:ds="http://schemas.openxmlformats.org/officeDocument/2006/customXml" ds:itemID="{7A22D130-614C-431C-BC34-0A693743B793}">
-  <ds:schemaRefs>
-    <ds:schemaRef ds:uri="http://schemas.microsoft.com/sharepoint/v3/contenttype/forms"/>
-  </ds:schemaRefs>
-</ds:datastoreItem>
+<file path=customXml/item3.xml><?xml version="1.0" encoding="utf-8"?>
+<p:properties xmlns:p="http://schemas.microsoft.com/office/2006/metadata/properties" xmlns:xsi="http://www.w3.org/2001/XMLSchema-instance" xmlns:pc="http://schemas.microsoft.com/office/infopath/2007/PartnerControls">
+  <documentManagement>
+    <PublishingExpirationDate xmlns="http://schemas.microsoft.com/sharepoint/v3" xsi:nil="true"/>
+    <AverageRating xmlns="http://schemas.microsoft.com/sharepoint/v3" xsi:nil="true"/>
+    <PublishingStartDate xmlns="http://schemas.microsoft.com/sharepoint/v3" xsi:nil="true"/>
+    <TaxCatchAll xmlns="eaa6d935-851e-4683-8fb3-4830ef9470e6">
+      <Value>64</Value>
+      <Value>69</Value>
+      <Value>57</Value>
+      <Value>97</Value>
+      <Value>68</Value>
+      <Value>73</Value>
+    </TaxCatchAll>
+    <TaxKeywordTaxHTField xmlns="eaa6d935-851e-4683-8fb3-4830ef9470e6">
+      <Terms xmlns="http://schemas.microsoft.com/office/infopath/2007/PartnerControls"/>
+    </TaxKeywordTaxHTField>
+    <p986eefbff5f4b2788134fa6982c2730 xmlns="fdaf2857-34a0-4271-9efd-53feeda81814">
+      <Terms xmlns="http://schemas.microsoft.com/office/infopath/2007/PartnerControls">
+        <TermInfo xmlns="http://schemas.microsoft.com/office/infopath/2007/PartnerControls">
+          <TermName xmlns="http://schemas.microsoft.com/office/infopath/2007/PartnerControls">Not applicable</TermName>
+          <TermId xmlns="http://schemas.microsoft.com/office/infopath/2007/PartnerControls">15480a47-f0f1-4795-a643-bf3b2e95805c</TermId>
+        </TermInfo>
+      </Terms>
+    </p986eefbff5f4b2788134fa6982c2730>
+    <m0c14ac2d9c042e3be8883c9fd5ef198 xmlns="fdaf2857-34a0-4271-9efd-53feeda81814">
+      <Terms xmlns="http://schemas.microsoft.com/office/infopath/2007/PartnerControls">
+        <TermInfo xmlns="http://schemas.microsoft.com/office/infopath/2007/PartnerControls">
+          <TermName xmlns="http://schemas.microsoft.com/office/infopath/2007/PartnerControls">English</TermName>
+          <TermId xmlns="http://schemas.microsoft.com/office/infopath/2007/PartnerControls">914398da-6a81-430b-8d1c-6a7bd1227f71</TermId>
+        </TermInfo>
+      </Terms>
+    </m0c14ac2d9c042e3be8883c9fd5ef198>
+    <a9556e1ac9ee423090b285ae20260b00 xmlns="fdaf2857-34a0-4271-9efd-53feeda81814">
+      <Terms xmlns="http://schemas.microsoft.com/office/infopath/2007/PartnerControls">
+        <TermInfo xmlns="http://schemas.microsoft.com/office/infopath/2007/PartnerControls">
+          <TermName xmlns="http://schemas.microsoft.com/office/infopath/2007/PartnerControls">Cross Sector</TermName>
+          <TermId xmlns="http://schemas.microsoft.com/office/infopath/2007/PartnerControls">d51dcd69-a6f7-4fb6-bc11-144a9da6fd82</TermId>
+        </TermInfo>
+      </Terms>
+    </a9556e1ac9ee423090b285ae20260b00>
+    <h059eda5e5c344e5901eabd9b8ae1d5d xmlns="fdaf2857-34a0-4271-9efd-53feeda81814">
+      <Terms xmlns="http://schemas.microsoft.com/office/infopath/2007/PartnerControls">
+        <TermInfo xmlns="http://schemas.microsoft.com/office/infopath/2007/PartnerControls">
+          <TermName xmlns="http://schemas.microsoft.com/office/infopath/2007/PartnerControls">Not applicable</TermName>
+          <TermId xmlns="http://schemas.microsoft.com/office/infopath/2007/PartnerControls">1b0d69d1-6137-41de-9ae5-e5925610d8cb</TermId>
+        </TermInfo>
+      </Terms>
+    </h059eda5e5c344e5901eabd9b8ae1d5d>
+    <e999b8edfbce4772b22c3a8c74ff36ce xmlns="fdaf2857-34a0-4271-9efd-53feeda81814">
+      <Terms xmlns="http://schemas.microsoft.com/office/infopath/2007/PartnerControls"/>
+    </e999b8edfbce4772b22c3a8c74ff36ce>
+    <i6d89d2a22ad4b4885b9858a4f35747a xmlns="fdaf2857-34a0-4271-9efd-53feeda81814">
+      <Terms xmlns="http://schemas.microsoft.com/office/infopath/2007/PartnerControls">
+        <TermInfo xmlns="http://schemas.microsoft.com/office/infopath/2007/PartnerControls">
+          <TermName xmlns="http://schemas.microsoft.com/office/infopath/2007/PartnerControls">Global</TermName>
+          <TermId xmlns="http://schemas.microsoft.com/office/infopath/2007/PartnerControls">3eaca359-c4b3-4b51-a927-e9852da92384</TermId>
+        </TermInfo>
+      </Terms>
+    </i6d89d2a22ad4b4885b9858a4f35747a>
+    <jf0640f97dcd40049d3fc8c3d10ff855 xmlns="fdaf2857-34a0-4271-9efd-53feeda81814">
+      <Terms xmlns="http://schemas.microsoft.com/office/infopath/2007/PartnerControls">
+        <TermInfo xmlns="http://schemas.microsoft.com/office/infopath/2007/PartnerControls">
+          <TermName xmlns="http://schemas.microsoft.com/office/infopath/2007/PartnerControls">Not applicable</TermName>
+          <TermId xmlns="http://schemas.microsoft.com/office/infopath/2007/PartnerControls">457da623-78f9-49de-8564-b1618c49ba59</TermId>
+        </TermInfo>
+      </Terms>
+    </jf0640f97dcd40049d3fc8c3d10ff855>
+  </documentManagement>
+</p:properties>
 </file>
 
-<file path=customXml/itemProps3.xml><?xml version="1.0" encoding="utf-8"?>
+<file path=customXml/itemProps1.xml><?xml version="1.0" encoding="utf-8"?>
 <ds:datastoreItem xmlns:ds="http://schemas.openxmlformats.org/officeDocument/2006/customXml" ds:itemID="{D505B3AB-DE03-4E70-A7AB-24562E2EA8E1}">
   <ds:schemaRefs>
     <ds:schemaRef ds:uri="http://schemas.microsoft.com/office/2006/metadata/contentType"/>
@@ -26059,4 +25992,30 @@
     <ds:schemaRef ds:uri="http://schemas.microsoft.com/internal/obd"/>
   </ds:schemaRefs>
 </ds:datastoreItem>
+</file>
+
+<file path=customXml/itemProps2.xml><?xml version="1.0" encoding="utf-8"?>
+<ds:datastoreItem xmlns:ds="http://schemas.openxmlformats.org/officeDocument/2006/customXml" ds:itemID="{7A22D130-614C-431C-BC34-0A693743B793}">
+  <ds:schemaRefs>
+    <ds:schemaRef ds:uri="http://schemas.microsoft.com/sharepoint/v3/contenttype/forms"/>
+  </ds:schemaRefs>
+</ds:datastoreItem>
+</file>
+
+<file path=customXml/itemProps3.xml><?xml version="1.0" encoding="utf-8"?>
+<ds:datastoreItem xmlns:ds="http://schemas.openxmlformats.org/officeDocument/2006/customXml" ds:itemID="{34AB0903-C811-4386-89A0-517F35E2B28C}">
+  <ds:schemaRefs>
+    <ds:schemaRef ds:uri="http://www.w3.org/XML/1998/namespace"/>
+    <ds:schemaRef ds:uri="http://purl.org/dc/elements/1.1/"/>
+    <ds:schemaRef ds:uri="http://schemas.microsoft.com/sharepoint/v3"/>
+    <ds:schemaRef ds:uri="eaa6d935-851e-4683-8fb3-4830ef9470e6"/>
+    <ds:schemaRef ds:uri="http://purl.org/dc/terms/"/>
+    <ds:schemaRef ds:uri="http://schemas.openxmlformats.org/package/2006/metadata/core-properties"/>
+    <ds:schemaRef ds:uri="http://schemas.microsoft.com/office/2006/documentManagement/types"/>
+    <ds:schemaRef ds:uri="http://schemas.microsoft.com/office/2006/metadata/properties"/>
+    <ds:schemaRef ds:uri="http://schemas.microsoft.com/office/infopath/2007/PartnerControls"/>
+    <ds:schemaRef ds:uri="fdaf2857-34a0-4271-9efd-53feeda81814"/>
+    <ds:schemaRef ds:uri="http://purl.org/dc/dcmitype/"/>
+  </ds:schemaRefs>
+</ds:datastoreItem>
 </file>
</xml_diff>

<commit_message>
A few edits in the presentati
</commit_message>
<xml_diff>
--- a/2_Processing/NYC Psychotherapists.pptx
+++ b/2_Processing/NYC Psychotherapists.pptx
@@ -205,6 +205,159 @@
           </p14:sldIdLst>
         </p14:section>
       </p14:sectionLst>
+    </p:ext>
+    <p:ext uri="{EFAFB233-063F-42B5-8137-9DF3F51BA10A}">
+      <p15:sldGuideLst xmlns:p15="http://schemas.microsoft.com/office/powerpoint/2012/main">
+        <p15:guide id="1" orient="horz" pos="2981">
+          <p15:clr>
+            <a:srgbClr val="A4A3A4"/>
+          </p15:clr>
+        </p15:guide>
+        <p15:guide id="2" orient="horz" pos="3026">
+          <p15:clr>
+            <a:srgbClr val="A4A3A4"/>
+          </p15:clr>
+        </p15:guide>
+        <p15:guide id="3" orient="horz" pos="3117">
+          <p15:clr>
+            <a:srgbClr val="A4A3A4"/>
+          </p15:clr>
+        </p15:guide>
+        <p15:guide id="4" orient="horz" pos="622">
+          <p15:clr>
+            <a:srgbClr val="A4A3A4"/>
+          </p15:clr>
+        </p15:guide>
+        <p15:guide id="5" orient="horz" pos="2618">
+          <p15:clr>
+            <a:srgbClr val="A4A3A4"/>
+          </p15:clr>
+        </p15:guide>
+        <p15:guide id="6" orient="horz" pos="2527">
+          <p15:clr>
+            <a:srgbClr val="A4A3A4"/>
+          </p15:clr>
+        </p15:guide>
+        <p15:guide id="7" orient="horz" pos="2119">
+          <p15:clr>
+            <a:srgbClr val="A4A3A4"/>
+          </p15:clr>
+        </p15:guide>
+        <p15:guide id="8" orient="horz" pos="2028">
+          <p15:clr>
+            <a:srgbClr val="A4A3A4"/>
+          </p15:clr>
+        </p15:guide>
+        <p15:guide id="9" orient="horz" pos="1620">
+          <p15:clr>
+            <a:srgbClr val="A4A3A4"/>
+          </p15:clr>
+        </p15:guide>
+        <p15:guide id="10" orient="horz" pos="1529">
+          <p15:clr>
+            <a:srgbClr val="A4A3A4"/>
+          </p15:clr>
+        </p15:guide>
+        <p15:guide id="11" orient="horz" pos="1121">
+          <p15:clr>
+            <a:srgbClr val="A4A3A4"/>
+          </p15:clr>
+        </p15:guide>
+        <p15:guide id="12" orient="horz" pos="1030">
+          <p15:clr>
+            <a:srgbClr val="A4A3A4"/>
+          </p15:clr>
+        </p15:guide>
+        <p15:guide id="13" orient="horz" pos="486">
+          <p15:clr>
+            <a:srgbClr val="A4A3A4"/>
+          </p15:clr>
+        </p15:guide>
+        <p15:guide id="14" pos="2835">
+          <p15:clr>
+            <a:srgbClr val="A4A3A4"/>
+          </p15:clr>
+        </p15:guide>
+        <p15:guide id="15" pos="2925">
+          <p15:clr>
+            <a:srgbClr val="A4A3A4"/>
+          </p15:clr>
+        </p15:guide>
+        <p15:guide id="16" pos="3742">
+          <p15:clr>
+            <a:srgbClr val="A4A3A4"/>
+          </p15:clr>
+        </p15:guide>
+        <p15:guide id="17" pos="3833">
+          <p15:clr>
+            <a:srgbClr val="A4A3A4"/>
+          </p15:clr>
+        </p15:guide>
+        <p15:guide id="18" pos="4649">
+          <p15:clr>
+            <a:srgbClr val="A4A3A4"/>
+          </p15:clr>
+        </p15:guide>
+        <p15:guide id="19" pos="4740">
+          <p15:clr>
+            <a:srgbClr val="A4A3A4"/>
+          </p15:clr>
+        </p15:guide>
+        <p15:guide id="20" pos="2018">
+          <p15:clr>
+            <a:srgbClr val="A4A3A4"/>
+          </p15:clr>
+        </p15:guide>
+        <p15:guide id="21" pos="1927">
+          <p15:clr>
+            <a:srgbClr val="A4A3A4"/>
+          </p15:clr>
+        </p15:guide>
+        <p15:guide id="22" pos="1111">
+          <p15:clr>
+            <a:srgbClr val="A4A3A4"/>
+          </p15:clr>
+        </p15:guide>
+        <p15:guide id="23" pos="1020">
+          <p15:clr>
+            <a:srgbClr val="A4A3A4"/>
+          </p15:clr>
+        </p15:guide>
+        <p15:guide id="24" pos="204">
+          <p15:clr>
+            <a:srgbClr val="A4A3A4"/>
+          </p15:clr>
+        </p15:guide>
+        <p15:guide id="25" pos="5556">
+          <p15:clr>
+            <a:srgbClr val="A4A3A4"/>
+          </p15:clr>
+        </p15:guide>
+      </p15:sldGuideLst>
+    </p:ext>
+    <p:ext uri="{2D200454-40CA-4A62-9FC3-DE9A4176ACB9}">
+      <p15:notesGuideLst xmlns:p15="http://schemas.microsoft.com/office/powerpoint/2012/main">
+        <p15:guide id="1" orient="horz" pos="5938">
+          <p15:clr>
+            <a:srgbClr val="A4A3A4"/>
+          </p15:clr>
+        </p15:guide>
+        <p15:guide id="2" orient="horz" pos="495">
+          <p15:clr>
+            <a:srgbClr val="A4A3A4"/>
+          </p15:clr>
+        </p15:guide>
+        <p15:guide id="3" pos="281">
+          <p15:clr>
+            <a:srgbClr val="A4A3A4"/>
+          </p15:clr>
+        </p15:guide>
+        <p15:guide id="4" pos="4001">
+          <p15:clr>
+            <a:srgbClr val="A4A3A4"/>
+          </p15:clr>
+        </p15:guide>
+      </p15:notesGuideLst>
     </p:ext>
   </p:extLst>
 </p:presentation>
@@ -23497,7 +23650,7 @@
           <a:p>
             <a:r>
               <a:rPr lang="en-US" dirty="0" smtClean="0"/>
-              <a:t>Further insights can be gained from the data set</a:t>
+              <a:t>Directions for future research</a:t>
             </a:r>
             <a:endParaRPr lang="en-US" dirty="0"/>
           </a:p>
@@ -23534,11 +23687,7 @@
             </a:pPr>
             <a:r>
               <a:rPr lang="en-US" dirty="0" smtClean="0"/>
-              <a:t>What therapist characteristics predict session fee and/or acceptance of insurance, and how</a:t>
-            </a:r>
-            <a:r>
-              <a:rPr lang="en-US" dirty="0" smtClean="0"/>
-              <a:t>?</a:t>
+              <a:t>What therapist characteristics predict session fee and/or acceptance of insurance, and how?</a:t>
             </a:r>
             <a:endParaRPr lang="en-US" dirty="0"/>
           </a:p>
@@ -23549,11 +23698,23 @@
             </a:pPr>
             <a:r>
               <a:rPr lang="en-US" dirty="0" smtClean="0"/>
-              <a:t>Further, if one collects additional data on number of people working in each zip code, the causes for therapist numbers per zip code could be further </a:t>
+              <a:t>Collect </a:t>
             </a:r>
             <a:r>
               <a:rPr lang="en-US" dirty="0" smtClean="0"/>
-              <a:t>illuminated.</a:t>
+              <a:t>additional data </a:t>
+            </a:r>
+            <a:r>
+              <a:rPr lang="en-US" dirty="0" smtClean="0"/>
+              <a:t>at zip level, e.g., number </a:t>
+            </a:r>
+            <a:r>
+              <a:rPr lang="en-US" dirty="0" smtClean="0"/>
+              <a:t>of people working in each zip code, </a:t>
+            </a:r>
+            <a:r>
+              <a:rPr lang="en-US" dirty="0" smtClean="0"/>
+              <a:t>to further study possible causes of differing therapist density.</a:t>
             </a:r>
             <a:endParaRPr lang="en-US" dirty="0"/>
           </a:p>
@@ -23562,9 +23723,39 @@
               <a:buFont typeface="Arial" panose="020B0604020202020204" pitchFamily="34" charset="0"/>
               <a:buChar char="•"/>
             </a:pPr>
+            <a:endParaRPr lang="en-US" dirty="0" smtClean="0"/>
+          </a:p>
+          <a:p>
             <a:r>
               <a:rPr lang="en-US" dirty="0" smtClean="0"/>
-              <a:t>Therapist considering opening a practice in a given zip code could gain valuable insights that could have marketing implications.</a:t>
+              <a:t>Practical Implications of this data set:</a:t>
+            </a:r>
+            <a:endParaRPr lang="en-US" dirty="0"/>
+          </a:p>
+          <a:p>
+            <a:pPr marL="285750" indent="-285750">
+              <a:buFont typeface="Arial" panose="020B0604020202020204" pitchFamily="34" charset="0"/>
+              <a:buChar char="•"/>
+            </a:pPr>
+            <a:r>
+              <a:rPr lang="en-US" dirty="0" smtClean="0"/>
+              <a:t>Therapist </a:t>
+            </a:r>
+            <a:r>
+              <a:rPr lang="en-US" dirty="0" smtClean="0"/>
+              <a:t>considering opening a practice in a given </a:t>
+            </a:r>
+            <a:r>
+              <a:rPr lang="en-US" dirty="0" smtClean="0"/>
+              <a:t>NYC zip </a:t>
+            </a:r>
+            <a:r>
+              <a:rPr lang="en-US" dirty="0" smtClean="0"/>
+              <a:t>code could gain valuable insights </a:t>
+            </a:r>
+            <a:r>
+              <a:rPr lang="en-US" dirty="0" smtClean="0"/>
+              <a:t>that allow them to differentiate themselves from competitors.</a:t>
             </a:r>
             <a:endParaRPr lang="en-US" dirty="0"/>
           </a:p>
@@ -23643,7 +23834,25 @@
           <a:p>
             <a:r>
               <a:rPr lang="en-US" dirty="0" smtClean="0"/>
-              <a:t>Questions?</a:t>
+              <a:t/>
+            </a:r>
+            <a:br>
+              <a:rPr lang="en-US" dirty="0" smtClean="0"/>
+            </a:br>
+            <a:r>
+              <a:rPr lang="en-US" dirty="0" smtClean="0"/>
+              <a:t>Thank you!</a:t>
+            </a:r>
+            <a:r>
+              <a:rPr lang="en-US" dirty="0"/>
+              <a:t/>
+            </a:r>
+            <a:br>
+              <a:rPr lang="en-US" dirty="0"/>
+            </a:br>
+            <a:r>
+              <a:rPr lang="en-US" dirty="0" smtClean="0"/>
+              <a:t>Q&amp;A</a:t>
             </a:r>
             <a:endParaRPr lang="en-US" dirty="0"/>
           </a:p>
@@ -24384,14 +24593,7 @@
                 <a:latin typeface="Arial" pitchFamily="34" charset="0"/>
                 <a:cs typeface="Arial" pitchFamily="34" charset="0"/>
               </a:rPr>
-              <a:t>Cleaned </a:t>
-            </a:r>
-            <a:r>
-              <a:rPr lang="en-US" sz="1600" noProof="1" smtClean="0">
-                <a:latin typeface="Arial" pitchFamily="34" charset="0"/>
-                <a:cs typeface="Arial" pitchFamily="34" charset="0"/>
-              </a:rPr>
-              <a:t>non-standard open-end entries by therapists</a:t>
+              <a:t>Cleaned non-standard open-end entries by therapists</a:t>
             </a:r>
             <a:endParaRPr lang="en-US" sz="1600" noProof="1">
               <a:latin typeface="Arial" pitchFamily="34" charset="0"/>
@@ -25853,78 +26055,6 @@
 </file>
 
 <file path=customXml/item1.xml><?xml version="1.0" encoding="utf-8"?>
-<p:properties xmlns:p="http://schemas.microsoft.com/office/2006/metadata/properties" xmlns:xsi="http://www.w3.org/2001/XMLSchema-instance" xmlns:pc="http://schemas.microsoft.com/office/infopath/2007/PartnerControls">
-  <documentManagement>
-    <PublishingExpirationDate xmlns="http://schemas.microsoft.com/sharepoint/v3" xsi:nil="true"/>
-    <AverageRating xmlns="http://schemas.microsoft.com/sharepoint/v3" xsi:nil="true"/>
-    <PublishingStartDate xmlns="http://schemas.microsoft.com/sharepoint/v3" xsi:nil="true"/>
-    <TaxCatchAll xmlns="eaa6d935-851e-4683-8fb3-4830ef9470e6">
-      <Value>64</Value>
-      <Value>69</Value>
-      <Value>57</Value>
-      <Value>97</Value>
-      <Value>68</Value>
-      <Value>73</Value>
-    </TaxCatchAll>
-    <TaxKeywordTaxHTField xmlns="eaa6d935-851e-4683-8fb3-4830ef9470e6">
-      <Terms xmlns="http://schemas.microsoft.com/office/infopath/2007/PartnerControls"/>
-    </TaxKeywordTaxHTField>
-    <p986eefbff5f4b2788134fa6982c2730 xmlns="fdaf2857-34a0-4271-9efd-53feeda81814">
-      <Terms xmlns="http://schemas.microsoft.com/office/infopath/2007/PartnerControls">
-        <TermInfo xmlns="http://schemas.microsoft.com/office/infopath/2007/PartnerControls">
-          <TermName xmlns="http://schemas.microsoft.com/office/infopath/2007/PartnerControls">Not applicable</TermName>
-          <TermId xmlns="http://schemas.microsoft.com/office/infopath/2007/PartnerControls">15480a47-f0f1-4795-a643-bf3b2e95805c</TermId>
-        </TermInfo>
-      </Terms>
-    </p986eefbff5f4b2788134fa6982c2730>
-    <m0c14ac2d9c042e3be8883c9fd5ef198 xmlns="fdaf2857-34a0-4271-9efd-53feeda81814">
-      <Terms xmlns="http://schemas.microsoft.com/office/infopath/2007/PartnerControls">
-        <TermInfo xmlns="http://schemas.microsoft.com/office/infopath/2007/PartnerControls">
-          <TermName xmlns="http://schemas.microsoft.com/office/infopath/2007/PartnerControls">English</TermName>
-          <TermId xmlns="http://schemas.microsoft.com/office/infopath/2007/PartnerControls">914398da-6a81-430b-8d1c-6a7bd1227f71</TermId>
-        </TermInfo>
-      </Terms>
-    </m0c14ac2d9c042e3be8883c9fd5ef198>
-    <a9556e1ac9ee423090b285ae20260b00 xmlns="fdaf2857-34a0-4271-9efd-53feeda81814">
-      <Terms xmlns="http://schemas.microsoft.com/office/infopath/2007/PartnerControls">
-        <TermInfo xmlns="http://schemas.microsoft.com/office/infopath/2007/PartnerControls">
-          <TermName xmlns="http://schemas.microsoft.com/office/infopath/2007/PartnerControls">Cross Sector</TermName>
-          <TermId xmlns="http://schemas.microsoft.com/office/infopath/2007/PartnerControls">d51dcd69-a6f7-4fb6-bc11-144a9da6fd82</TermId>
-        </TermInfo>
-      </Terms>
-    </a9556e1ac9ee423090b285ae20260b00>
-    <h059eda5e5c344e5901eabd9b8ae1d5d xmlns="fdaf2857-34a0-4271-9efd-53feeda81814">
-      <Terms xmlns="http://schemas.microsoft.com/office/infopath/2007/PartnerControls">
-        <TermInfo xmlns="http://schemas.microsoft.com/office/infopath/2007/PartnerControls">
-          <TermName xmlns="http://schemas.microsoft.com/office/infopath/2007/PartnerControls">Not applicable</TermName>
-          <TermId xmlns="http://schemas.microsoft.com/office/infopath/2007/PartnerControls">1b0d69d1-6137-41de-9ae5-e5925610d8cb</TermId>
-        </TermInfo>
-      </Terms>
-    </h059eda5e5c344e5901eabd9b8ae1d5d>
-    <e999b8edfbce4772b22c3a8c74ff36ce xmlns="fdaf2857-34a0-4271-9efd-53feeda81814">
-      <Terms xmlns="http://schemas.microsoft.com/office/infopath/2007/PartnerControls"/>
-    </e999b8edfbce4772b22c3a8c74ff36ce>
-    <i6d89d2a22ad4b4885b9858a4f35747a xmlns="fdaf2857-34a0-4271-9efd-53feeda81814">
-      <Terms xmlns="http://schemas.microsoft.com/office/infopath/2007/PartnerControls">
-        <TermInfo xmlns="http://schemas.microsoft.com/office/infopath/2007/PartnerControls">
-          <TermName xmlns="http://schemas.microsoft.com/office/infopath/2007/PartnerControls">Global</TermName>
-          <TermId xmlns="http://schemas.microsoft.com/office/infopath/2007/PartnerControls">3eaca359-c4b3-4b51-a927-e9852da92384</TermId>
-        </TermInfo>
-      </Terms>
-    </i6d89d2a22ad4b4885b9858a4f35747a>
-    <jf0640f97dcd40049d3fc8c3d10ff855 xmlns="fdaf2857-34a0-4271-9efd-53feeda81814">
-      <Terms xmlns="http://schemas.microsoft.com/office/infopath/2007/PartnerControls">
-        <TermInfo xmlns="http://schemas.microsoft.com/office/infopath/2007/PartnerControls">
-          <TermName xmlns="http://schemas.microsoft.com/office/infopath/2007/PartnerControls">Not applicable</TermName>
-          <TermId xmlns="http://schemas.microsoft.com/office/infopath/2007/PartnerControls">457da623-78f9-49de-8564-b1618c49ba59</TermId>
-        </TermInfo>
-      </Terms>
-    </jf0640f97dcd40049d3fc8c3d10ff855>
-  </documentManagement>
-</p:properties>
-</file>
-
-<file path=customXml/item2.xml><?xml version="1.0" encoding="utf-8"?>
 <?mso-contentType ?>
 <FormTemplates xmlns="http://schemas.microsoft.com/sharepoint/v3/contenttype/forms">
   <Display>DocumentLibraryForm</Display>
@@ -25933,7 +26063,7 @@
 </FormTemplates>
 </file>
 
-<file path=customXml/item3.xml><?xml version="1.0" encoding="utf-8"?>
+<file path=customXml/item2.xml><?xml version="1.0" encoding="utf-8"?>
 <ct:contentTypeSchema xmlns:ct="http://schemas.microsoft.com/office/2006/metadata/contentType" xmlns:ma="http://schemas.microsoft.com/office/2006/metadata/properties/metaAttributes" ct:_="" ma:_="" ma:contentTypeName="Document" ma:contentTypeID="0x010100D9151DFF91B0A44197B29C020F8C642F" ma:contentTypeVersion="44" ma:contentTypeDescription="Create a new document." ma:contentTypeScope="" ma:versionID="37d6c69e0f0b1eab2d91fd3d2fe12a06">
   <xsd:schema xmlns:xsd="http://www.w3.org/2001/XMLSchema" xmlns:xs="http://www.w3.org/2001/XMLSchema" xmlns:p="http://schemas.microsoft.com/office/2006/metadata/properties" xmlns:ns1="http://schemas.microsoft.com/sharepoint/v3" xmlns:ns2="fdaf2857-34a0-4271-9efd-53feeda81814" xmlns:ns3="eaa6d935-851e-4683-8fb3-4830ef9470e6" targetNamespace="http://schemas.microsoft.com/office/2006/metadata/properties" ma:root="true" ma:fieldsID="306287739f13a793c1a58b147bf45c68" ns1:_="" ns2:_="" ns3:_="">
     <xsd:import namespace="http://schemas.microsoft.com/sharepoint/v3"/>
@@ -26175,25 +26305,79 @@
 </ct:contentTypeSchema>
 </file>
 
-<file path=customXml/itemProps1.xml><?xml version="1.0" encoding="utf-8"?>
-<ds:datastoreItem xmlns:ds="http://schemas.openxmlformats.org/officeDocument/2006/customXml" ds:itemID="{34AB0903-C811-4386-89A0-517F35E2B28C}">
-  <ds:schemaRefs>
-    <ds:schemaRef ds:uri="http://www.w3.org/XML/1998/namespace"/>
-    <ds:schemaRef ds:uri="http://purl.org/dc/elements/1.1/"/>
-    <ds:schemaRef ds:uri="http://schemas.microsoft.com/sharepoint/v3"/>
-    <ds:schemaRef ds:uri="eaa6d935-851e-4683-8fb3-4830ef9470e6"/>
-    <ds:schemaRef ds:uri="http://purl.org/dc/terms/"/>
-    <ds:schemaRef ds:uri="http://schemas.openxmlformats.org/package/2006/metadata/core-properties"/>
-    <ds:schemaRef ds:uri="http://schemas.microsoft.com/office/2006/documentManagement/types"/>
-    <ds:schemaRef ds:uri="http://schemas.microsoft.com/office/2006/metadata/properties"/>
-    <ds:schemaRef ds:uri="http://schemas.microsoft.com/office/infopath/2007/PartnerControls"/>
-    <ds:schemaRef ds:uri="fdaf2857-34a0-4271-9efd-53feeda81814"/>
-    <ds:schemaRef ds:uri="http://purl.org/dc/dcmitype/"/>
-  </ds:schemaRefs>
-</ds:datastoreItem>
+<file path=customXml/item3.xml><?xml version="1.0" encoding="utf-8"?>
+<p:properties xmlns:p="http://schemas.microsoft.com/office/2006/metadata/properties" xmlns:xsi="http://www.w3.org/2001/XMLSchema-instance" xmlns:pc="http://schemas.microsoft.com/office/infopath/2007/PartnerControls">
+  <documentManagement>
+    <PublishingExpirationDate xmlns="http://schemas.microsoft.com/sharepoint/v3" xsi:nil="true"/>
+    <AverageRating xmlns="http://schemas.microsoft.com/sharepoint/v3" xsi:nil="true"/>
+    <PublishingStartDate xmlns="http://schemas.microsoft.com/sharepoint/v3" xsi:nil="true"/>
+    <TaxCatchAll xmlns="eaa6d935-851e-4683-8fb3-4830ef9470e6">
+      <Value>64</Value>
+      <Value>69</Value>
+      <Value>57</Value>
+      <Value>97</Value>
+      <Value>68</Value>
+      <Value>73</Value>
+    </TaxCatchAll>
+    <TaxKeywordTaxHTField xmlns="eaa6d935-851e-4683-8fb3-4830ef9470e6">
+      <Terms xmlns="http://schemas.microsoft.com/office/infopath/2007/PartnerControls"/>
+    </TaxKeywordTaxHTField>
+    <p986eefbff5f4b2788134fa6982c2730 xmlns="fdaf2857-34a0-4271-9efd-53feeda81814">
+      <Terms xmlns="http://schemas.microsoft.com/office/infopath/2007/PartnerControls">
+        <TermInfo xmlns="http://schemas.microsoft.com/office/infopath/2007/PartnerControls">
+          <TermName xmlns="http://schemas.microsoft.com/office/infopath/2007/PartnerControls">Not applicable</TermName>
+          <TermId xmlns="http://schemas.microsoft.com/office/infopath/2007/PartnerControls">15480a47-f0f1-4795-a643-bf3b2e95805c</TermId>
+        </TermInfo>
+      </Terms>
+    </p986eefbff5f4b2788134fa6982c2730>
+    <m0c14ac2d9c042e3be8883c9fd5ef198 xmlns="fdaf2857-34a0-4271-9efd-53feeda81814">
+      <Terms xmlns="http://schemas.microsoft.com/office/infopath/2007/PartnerControls">
+        <TermInfo xmlns="http://schemas.microsoft.com/office/infopath/2007/PartnerControls">
+          <TermName xmlns="http://schemas.microsoft.com/office/infopath/2007/PartnerControls">English</TermName>
+          <TermId xmlns="http://schemas.microsoft.com/office/infopath/2007/PartnerControls">914398da-6a81-430b-8d1c-6a7bd1227f71</TermId>
+        </TermInfo>
+      </Terms>
+    </m0c14ac2d9c042e3be8883c9fd5ef198>
+    <a9556e1ac9ee423090b285ae20260b00 xmlns="fdaf2857-34a0-4271-9efd-53feeda81814">
+      <Terms xmlns="http://schemas.microsoft.com/office/infopath/2007/PartnerControls">
+        <TermInfo xmlns="http://schemas.microsoft.com/office/infopath/2007/PartnerControls">
+          <TermName xmlns="http://schemas.microsoft.com/office/infopath/2007/PartnerControls">Cross Sector</TermName>
+          <TermId xmlns="http://schemas.microsoft.com/office/infopath/2007/PartnerControls">d51dcd69-a6f7-4fb6-bc11-144a9da6fd82</TermId>
+        </TermInfo>
+      </Terms>
+    </a9556e1ac9ee423090b285ae20260b00>
+    <h059eda5e5c344e5901eabd9b8ae1d5d xmlns="fdaf2857-34a0-4271-9efd-53feeda81814">
+      <Terms xmlns="http://schemas.microsoft.com/office/infopath/2007/PartnerControls">
+        <TermInfo xmlns="http://schemas.microsoft.com/office/infopath/2007/PartnerControls">
+          <TermName xmlns="http://schemas.microsoft.com/office/infopath/2007/PartnerControls">Not applicable</TermName>
+          <TermId xmlns="http://schemas.microsoft.com/office/infopath/2007/PartnerControls">1b0d69d1-6137-41de-9ae5-e5925610d8cb</TermId>
+        </TermInfo>
+      </Terms>
+    </h059eda5e5c344e5901eabd9b8ae1d5d>
+    <e999b8edfbce4772b22c3a8c74ff36ce xmlns="fdaf2857-34a0-4271-9efd-53feeda81814">
+      <Terms xmlns="http://schemas.microsoft.com/office/infopath/2007/PartnerControls"/>
+    </e999b8edfbce4772b22c3a8c74ff36ce>
+    <i6d89d2a22ad4b4885b9858a4f35747a xmlns="fdaf2857-34a0-4271-9efd-53feeda81814">
+      <Terms xmlns="http://schemas.microsoft.com/office/infopath/2007/PartnerControls">
+        <TermInfo xmlns="http://schemas.microsoft.com/office/infopath/2007/PartnerControls">
+          <TermName xmlns="http://schemas.microsoft.com/office/infopath/2007/PartnerControls">Global</TermName>
+          <TermId xmlns="http://schemas.microsoft.com/office/infopath/2007/PartnerControls">3eaca359-c4b3-4b51-a927-e9852da92384</TermId>
+        </TermInfo>
+      </Terms>
+    </i6d89d2a22ad4b4885b9858a4f35747a>
+    <jf0640f97dcd40049d3fc8c3d10ff855 xmlns="fdaf2857-34a0-4271-9efd-53feeda81814">
+      <Terms xmlns="http://schemas.microsoft.com/office/infopath/2007/PartnerControls">
+        <TermInfo xmlns="http://schemas.microsoft.com/office/infopath/2007/PartnerControls">
+          <TermName xmlns="http://schemas.microsoft.com/office/infopath/2007/PartnerControls">Not applicable</TermName>
+          <TermId xmlns="http://schemas.microsoft.com/office/infopath/2007/PartnerControls">457da623-78f9-49de-8564-b1618c49ba59</TermId>
+        </TermInfo>
+      </Terms>
+    </jf0640f97dcd40049d3fc8c3d10ff855>
+  </documentManagement>
+</p:properties>
 </file>
 
-<file path=customXml/itemProps2.xml><?xml version="1.0" encoding="utf-8"?>
+<file path=customXml/itemProps1.xml><?xml version="1.0" encoding="utf-8"?>
 <ds:datastoreItem xmlns:ds="http://schemas.openxmlformats.org/officeDocument/2006/customXml" ds:itemID="{7A22D130-614C-431C-BC34-0A693743B793}">
   <ds:schemaRefs>
     <ds:schemaRef ds:uri="http://schemas.microsoft.com/sharepoint/v3/contenttype/forms"/>
@@ -26201,7 +26385,7 @@
 </ds:datastoreItem>
 </file>
 
-<file path=customXml/itemProps3.xml><?xml version="1.0" encoding="utf-8"?>
+<file path=customXml/itemProps2.xml><?xml version="1.0" encoding="utf-8"?>
 <ds:datastoreItem xmlns:ds="http://schemas.openxmlformats.org/officeDocument/2006/customXml" ds:itemID="{D505B3AB-DE03-4E70-A7AB-24562E2EA8E1}">
   <ds:schemaRefs>
     <ds:schemaRef ds:uri="http://schemas.microsoft.com/office/2006/metadata/contentType"/>
@@ -26219,4 +26403,22 @@
     <ds:schemaRef ds:uri="http://schemas.microsoft.com/internal/obd"/>
   </ds:schemaRefs>
 </ds:datastoreItem>
+</file>
+
+<file path=customXml/itemProps3.xml><?xml version="1.0" encoding="utf-8"?>
+<ds:datastoreItem xmlns:ds="http://schemas.openxmlformats.org/officeDocument/2006/customXml" ds:itemID="{34AB0903-C811-4386-89A0-517F35E2B28C}">
+  <ds:schemaRefs>
+    <ds:schemaRef ds:uri="http://www.w3.org/XML/1998/namespace"/>
+    <ds:schemaRef ds:uri="http://purl.org/dc/elements/1.1/"/>
+    <ds:schemaRef ds:uri="http://schemas.microsoft.com/sharepoint/v3"/>
+    <ds:schemaRef ds:uri="eaa6d935-851e-4683-8fb3-4830ef9470e6"/>
+    <ds:schemaRef ds:uri="http://purl.org/dc/terms/"/>
+    <ds:schemaRef ds:uri="http://schemas.openxmlformats.org/package/2006/metadata/core-properties"/>
+    <ds:schemaRef ds:uri="http://schemas.microsoft.com/office/2006/documentManagement/types"/>
+    <ds:schemaRef ds:uri="http://schemas.microsoft.com/office/2006/metadata/properties"/>
+    <ds:schemaRef ds:uri="http://schemas.microsoft.com/office/infopath/2007/PartnerControls"/>
+    <ds:schemaRef ds:uri="fdaf2857-34a0-4271-9efd-53feeda81814"/>
+    <ds:schemaRef ds:uri="http://purl.org/dc/dcmitype/"/>
+  </ds:schemaRefs>
+</ds:datastoreItem>
 </file>
</xml_diff>

<commit_message>
Fixed colors of the map
</commit_message>
<xml_diff>
--- a/2_Processing/NYC Psychotherapists.pptx
+++ b/2_Processing/NYC Psychotherapists.pptx
@@ -22639,11 +22639,15 @@
           <a:p>
             <a:r>
               <a:rPr lang="en-US" dirty="0" smtClean="0"/>
-              <a:t>Map of “therapist density” in NYC by </a:t>
-            </a:r>
-            <a:r>
-              <a:rPr lang="en-US" dirty="0" err="1" smtClean="0"/>
-              <a:t>zipcode</a:t>
+              <a:t>Visualization </a:t>
+            </a:r>
+            <a:r>
+              <a:rPr lang="en-US" dirty="0" smtClean="0"/>
+              <a:t>of “therapist density” in NYC by </a:t>
+            </a:r>
+            <a:r>
+              <a:rPr lang="en-US" dirty="0" smtClean="0"/>
+              <a:t>zip code</a:t>
             </a:r>
             <a:endParaRPr lang="en-US" dirty="0"/>
           </a:p>
@@ -22670,7 +22674,7 @@
       </p:sp>
       <p:pic>
         <p:nvPicPr>
-          <p:cNvPr id="4" name="Picture 3"/>
+          <p:cNvPr id="6" name="Picture 5"/>
           <p:cNvPicPr>
             <a:picLocks noChangeAspect="1"/>
           </p:cNvPicPr>
@@ -22690,14 +22694,264 @@
         </p:blipFill>
         <p:spPr>
           <a:xfrm>
-            <a:off x="326835" y="971550"/>
-            <a:ext cx="7910709" cy="3962070"/>
+            <a:off x="304799" y="1047750"/>
+            <a:ext cx="7167741" cy="3895223"/>
           </a:xfrm>
           <a:prstGeom prst="rect">
             <a:avLst/>
           </a:prstGeom>
         </p:spPr>
       </p:pic>
+      <p:sp>
+        <p:nvSpPr>
+          <p:cNvPr id="7" name="Content Placeholder 2"/>
+          <p:cNvSpPr txBox="1">
+            <a:spLocks/>
+          </p:cNvSpPr>
+          <p:nvPr/>
+        </p:nvSpPr>
+        <p:spPr bwMode="gray">
+          <a:xfrm>
+            <a:off x="7467600" y="2266950"/>
+            <a:ext cx="1295400" cy="1143000"/>
+          </a:xfrm>
+          <a:prstGeom prst="rect">
+            <a:avLst/>
+          </a:prstGeom>
+        </p:spPr>
+        <p:txBody>
+          <a:bodyPr vert="horz" lIns="0" tIns="18000" rIns="0" bIns="0" rtlCol="0" anchor="t" anchorCtr="0">
+            <a:noAutofit/>
+          </a:bodyPr>
+          <a:lstStyle>
+            <a:lvl1pPr marL="0" marR="0" indent="0" algn="l" defTabSz="914400" rtl="0" eaLnBrk="1" fontAlgn="auto" latinLnBrk="0" hangingPunct="1">
+              <a:lnSpc>
+                <a:spcPct val="100000"/>
+              </a:lnSpc>
+              <a:spcBef>
+                <a:spcPts val="600"/>
+              </a:spcBef>
+              <a:spcAft>
+                <a:spcPts val="0"/>
+              </a:spcAft>
+              <a:buClrTx/>
+              <a:buSzTx/>
+              <a:buFont typeface="Arial" pitchFamily="34" charset="0"/>
+              <a:buNone/>
+              <a:tabLst/>
+              <a:defRPr sz="1800" kern="1200">
+                <a:solidFill>
+                  <a:schemeClr val="tx2"/>
+                </a:solidFill>
+                <a:latin typeface="Arial" pitchFamily="34" charset="0"/>
+                <a:ea typeface="+mn-ea"/>
+                <a:cs typeface="Arial" pitchFamily="34" charset="0"/>
+              </a:defRPr>
+            </a:lvl1pPr>
+            <a:lvl2pPr marL="0" marR="0" indent="0" algn="l" defTabSz="914400" rtl="0" eaLnBrk="1" fontAlgn="auto" latinLnBrk="0" hangingPunct="1">
+              <a:lnSpc>
+                <a:spcPct val="100000"/>
+              </a:lnSpc>
+              <a:spcBef>
+                <a:spcPts val="600"/>
+              </a:spcBef>
+              <a:spcAft>
+                <a:spcPts val="0"/>
+              </a:spcAft>
+              <a:buClrTx/>
+              <a:buSzTx/>
+              <a:buFont typeface="Arial" pitchFamily="34" charset="0"/>
+              <a:buNone/>
+              <a:tabLst/>
+              <a:defRPr sz="1600" kern="1200">
+                <a:solidFill>
+                  <a:schemeClr val="tx1"/>
+                </a:solidFill>
+                <a:latin typeface="Arial" pitchFamily="34" charset="0"/>
+                <a:ea typeface="+mn-ea"/>
+                <a:cs typeface="Arial" pitchFamily="34" charset="0"/>
+              </a:defRPr>
+            </a:lvl2pPr>
+            <a:lvl3pPr marL="180975" marR="0" indent="-180975" algn="l" defTabSz="914400" rtl="0" eaLnBrk="1" fontAlgn="auto" latinLnBrk="0" hangingPunct="1">
+              <a:lnSpc>
+                <a:spcPct val="100000"/>
+              </a:lnSpc>
+              <a:spcBef>
+                <a:spcPts val="300"/>
+              </a:spcBef>
+              <a:spcAft>
+                <a:spcPts val="0"/>
+              </a:spcAft>
+              <a:buClrTx/>
+              <a:buSzTx/>
+              <a:buFont typeface="Arial" pitchFamily="34" charset="0"/>
+              <a:buChar char="•"/>
+              <a:tabLst/>
+              <a:defRPr sz="1600" kern="1200">
+                <a:solidFill>
+                  <a:schemeClr val="tx1"/>
+                </a:solidFill>
+                <a:latin typeface="Arial" pitchFamily="34" charset="0"/>
+                <a:ea typeface="+mn-ea"/>
+                <a:cs typeface="Arial" pitchFamily="34" charset="0"/>
+              </a:defRPr>
+            </a:lvl3pPr>
+            <a:lvl4pPr marL="360000" marR="0" indent="-180975" algn="l" defTabSz="914400" rtl="0" eaLnBrk="1" fontAlgn="auto" latinLnBrk="0" hangingPunct="1">
+              <a:lnSpc>
+                <a:spcPct val="100000"/>
+              </a:lnSpc>
+              <a:spcBef>
+                <a:spcPts val="300"/>
+              </a:spcBef>
+              <a:spcAft>
+                <a:spcPts val="0"/>
+              </a:spcAft>
+              <a:buClrTx/>
+              <a:buSzTx/>
+              <a:buFont typeface="Arial" pitchFamily="34" charset="0"/>
+              <a:buChar char="•"/>
+              <a:tabLst/>
+              <a:defRPr sz="1600" kern="1200">
+                <a:solidFill>
+                  <a:schemeClr val="tx1"/>
+                </a:solidFill>
+                <a:latin typeface="Arial" pitchFamily="34" charset="0"/>
+                <a:ea typeface="+mn-ea"/>
+                <a:cs typeface="Arial" pitchFamily="34" charset="0"/>
+              </a:defRPr>
+            </a:lvl4pPr>
+            <a:lvl5pPr marL="540000" marR="0" indent="-180975" algn="l" defTabSz="914400" rtl="0" eaLnBrk="1" fontAlgn="auto" latinLnBrk="0" hangingPunct="1">
+              <a:lnSpc>
+                <a:spcPct val="100000"/>
+              </a:lnSpc>
+              <a:spcBef>
+                <a:spcPts val="300"/>
+              </a:spcBef>
+              <a:spcAft>
+                <a:spcPts val="0"/>
+              </a:spcAft>
+              <a:buClrTx/>
+              <a:buSzTx/>
+              <a:buFont typeface="Arial" pitchFamily="34" charset="0"/>
+              <a:buChar char="•"/>
+              <a:tabLst/>
+              <a:defRPr sz="1600" kern="1200">
+                <a:solidFill>
+                  <a:schemeClr val="tx1"/>
+                </a:solidFill>
+                <a:latin typeface="Arial" pitchFamily="34" charset="0"/>
+                <a:ea typeface="+mn-ea"/>
+                <a:cs typeface="Arial" pitchFamily="34" charset="0"/>
+              </a:defRPr>
+            </a:lvl5pPr>
+            <a:lvl6pPr marL="540000" marR="0" indent="-180975" algn="l" defTabSz="914400" rtl="0" eaLnBrk="1" fontAlgn="auto" latinLnBrk="0" hangingPunct="1">
+              <a:lnSpc>
+                <a:spcPct val="100000"/>
+              </a:lnSpc>
+              <a:spcBef>
+                <a:spcPts val="300"/>
+              </a:spcBef>
+              <a:spcAft>
+                <a:spcPts val="0"/>
+              </a:spcAft>
+              <a:buClrTx/>
+              <a:buSzTx/>
+              <a:buFont typeface="Arial" pitchFamily="34" charset="0"/>
+              <a:buChar char="•"/>
+              <a:tabLst/>
+              <a:defRPr sz="1600" kern="1200">
+                <a:solidFill>
+                  <a:schemeClr val="tx1"/>
+                </a:solidFill>
+                <a:latin typeface="Arial" pitchFamily="34" charset="0"/>
+                <a:ea typeface="+mn-ea"/>
+                <a:cs typeface="Arial" pitchFamily="34" charset="0"/>
+              </a:defRPr>
+            </a:lvl6pPr>
+            <a:lvl7pPr marL="540000" marR="0" indent="-180975" algn="l" defTabSz="914400" rtl="0" eaLnBrk="1" fontAlgn="auto" latinLnBrk="0" hangingPunct="1">
+              <a:lnSpc>
+                <a:spcPct val="100000"/>
+              </a:lnSpc>
+              <a:spcBef>
+                <a:spcPts val="300"/>
+              </a:spcBef>
+              <a:spcAft>
+                <a:spcPts val="0"/>
+              </a:spcAft>
+              <a:buClrTx/>
+              <a:buSzTx/>
+              <a:buFont typeface="Arial" pitchFamily="34" charset="0"/>
+              <a:buChar char="•"/>
+              <a:tabLst/>
+              <a:defRPr sz="1600" kern="1200">
+                <a:solidFill>
+                  <a:schemeClr val="tx1"/>
+                </a:solidFill>
+                <a:latin typeface="Arial" pitchFamily="34" charset="0"/>
+                <a:ea typeface="+mn-ea"/>
+                <a:cs typeface="Arial" pitchFamily="34" charset="0"/>
+              </a:defRPr>
+            </a:lvl7pPr>
+            <a:lvl8pPr marL="540000" indent="-180000" algn="l" defTabSz="914400" rtl="0" eaLnBrk="1" latinLnBrk="0" hangingPunct="1">
+              <a:spcBef>
+                <a:spcPts val="300"/>
+              </a:spcBef>
+              <a:spcAft>
+                <a:spcPts val="0"/>
+              </a:spcAft>
+              <a:buFont typeface="Arial" pitchFamily="34" charset="0"/>
+              <a:buChar char="•"/>
+              <a:defRPr sz="1600" kern="1200">
+                <a:solidFill>
+                  <a:schemeClr val="tx1"/>
+                </a:solidFill>
+                <a:latin typeface="Arial" pitchFamily="34" charset="0"/>
+                <a:ea typeface="+mn-ea"/>
+                <a:cs typeface="Arial" pitchFamily="34" charset="0"/>
+              </a:defRPr>
+            </a:lvl8pPr>
+            <a:lvl9pPr marL="540000" marR="0" indent="-180975" algn="l" defTabSz="914400" rtl="0" eaLnBrk="1" fontAlgn="auto" latinLnBrk="0" hangingPunct="1">
+              <a:lnSpc>
+                <a:spcPct val="100000"/>
+              </a:lnSpc>
+              <a:spcBef>
+                <a:spcPts val="300"/>
+              </a:spcBef>
+              <a:spcAft>
+                <a:spcPts val="0"/>
+              </a:spcAft>
+              <a:buClrTx/>
+              <a:buSzTx/>
+              <a:buFont typeface="Arial" pitchFamily="34" charset="0"/>
+              <a:buChar char="•"/>
+              <a:tabLst/>
+              <a:defRPr sz="1600" kern="1200">
+                <a:solidFill>
+                  <a:schemeClr val="tx1"/>
+                </a:solidFill>
+                <a:latin typeface="Arial" pitchFamily="34" charset="0"/>
+                <a:ea typeface="+mn-ea"/>
+                <a:cs typeface="Arial" pitchFamily="34" charset="0"/>
+              </a:defRPr>
+            </a:lvl9pPr>
+          </a:lstStyle>
+          <a:p>
+            <a:pPr marL="285750" indent="-285750">
+              <a:buFont typeface="Arial" pitchFamily="34" charset="0"/>
+              <a:buChar char="•"/>
+            </a:pPr>
+            <a:r>
+              <a:rPr lang="en-US" sz="1400" dirty="0" smtClean="0"/>
+              <a:t>“Density” = number of therapists per 1000 </a:t>
+            </a:r>
+            <a:r>
+              <a:rPr lang="en-US" sz="1400" dirty="0" smtClean="0"/>
+              <a:t>households</a:t>
+            </a:r>
+            <a:endParaRPr lang="en-US" sz="1400" dirty="0" smtClean="0"/>
+          </a:p>
+        </p:txBody>
+      </p:sp>
     </p:spTree>
     <p:extLst>
       <p:ext uri="{BB962C8B-B14F-4D97-AF65-F5344CB8AC3E}">
@@ -22818,7 +23072,7 @@
         <p:spPr bwMode="gray">
           <a:xfrm>
             <a:off x="5943600" y="1308249"/>
-            <a:ext cx="2819400" cy="2590800"/>
+            <a:ext cx="2819400" cy="1187301"/>
           </a:xfrm>
           <a:prstGeom prst="rect">
             <a:avLst/>
@@ -23698,23 +23952,7 @@
             </a:pPr>
             <a:r>
               <a:rPr lang="en-US" dirty="0" smtClean="0"/>
-              <a:t>Collect </a:t>
-            </a:r>
-            <a:r>
-              <a:rPr lang="en-US" dirty="0" smtClean="0"/>
-              <a:t>additional data </a:t>
-            </a:r>
-            <a:r>
-              <a:rPr lang="en-US" dirty="0" smtClean="0"/>
-              <a:t>at zip level, e.g., number </a:t>
-            </a:r>
-            <a:r>
-              <a:rPr lang="en-US" dirty="0" smtClean="0"/>
-              <a:t>of people working in each zip code, </a:t>
-            </a:r>
-            <a:r>
-              <a:rPr lang="en-US" dirty="0" smtClean="0"/>
-              <a:t>to further study possible causes of differing therapist density.</a:t>
+              <a:t>Collect additional data at zip level, e.g., number of people working in each zip code, to further study possible causes of differing therapist density.</a:t>
             </a:r>
             <a:endParaRPr lang="en-US" dirty="0"/>
           </a:p>
@@ -23739,23 +23977,7 @@
             </a:pPr>
             <a:r>
               <a:rPr lang="en-US" dirty="0" smtClean="0"/>
-              <a:t>Therapist </a:t>
-            </a:r>
-            <a:r>
-              <a:rPr lang="en-US" dirty="0" smtClean="0"/>
-              <a:t>considering opening a practice in a given </a:t>
-            </a:r>
-            <a:r>
-              <a:rPr lang="en-US" dirty="0" smtClean="0"/>
-              <a:t>NYC zip </a:t>
-            </a:r>
-            <a:r>
-              <a:rPr lang="en-US" dirty="0" smtClean="0"/>
-              <a:t>code could gain valuable insights </a:t>
-            </a:r>
-            <a:r>
-              <a:rPr lang="en-US" dirty="0" smtClean="0"/>
-              <a:t>that allow them to differentiate themselves from competitors.</a:t>
+              <a:t>Therapist considering opening a practice in a given NYC zip code could gain valuable insights that allow them to differentiate themselves from competitors.</a:t>
             </a:r>
             <a:endParaRPr lang="en-US" dirty="0"/>
           </a:p>
@@ -26055,15 +26277,6 @@
 </file>
 
 <file path=customXml/item1.xml><?xml version="1.0" encoding="utf-8"?>
-<?mso-contentType ?>
-<FormTemplates xmlns="http://schemas.microsoft.com/sharepoint/v3/contenttype/forms">
-  <Display>DocumentLibraryForm</Display>
-  <Edit>DocumentLibraryForm</Edit>
-  <New>DocumentLibraryForm</New>
-</FormTemplates>
-</file>
-
-<file path=customXml/item2.xml><?xml version="1.0" encoding="utf-8"?>
 <ct:contentTypeSchema xmlns:ct="http://schemas.microsoft.com/office/2006/metadata/contentType" xmlns:ma="http://schemas.microsoft.com/office/2006/metadata/properties/metaAttributes" ct:_="" ma:_="" ma:contentTypeName="Document" ma:contentTypeID="0x010100D9151DFF91B0A44197B29C020F8C642F" ma:contentTypeVersion="44" ma:contentTypeDescription="Create a new document." ma:contentTypeScope="" ma:versionID="37d6c69e0f0b1eab2d91fd3d2fe12a06">
   <xsd:schema xmlns:xsd="http://www.w3.org/2001/XMLSchema" xmlns:xs="http://www.w3.org/2001/XMLSchema" xmlns:p="http://schemas.microsoft.com/office/2006/metadata/properties" xmlns:ns1="http://schemas.microsoft.com/sharepoint/v3" xmlns:ns2="fdaf2857-34a0-4271-9efd-53feeda81814" xmlns:ns3="eaa6d935-851e-4683-8fb3-4830ef9470e6" targetNamespace="http://schemas.microsoft.com/office/2006/metadata/properties" ma:root="true" ma:fieldsID="306287739f13a793c1a58b147bf45c68" ns1:_="" ns2:_="" ns3:_="">
     <xsd:import namespace="http://schemas.microsoft.com/sharepoint/v3"/>
@@ -26305,7 +26518,7 @@
 </ct:contentTypeSchema>
 </file>
 
-<file path=customXml/item3.xml><?xml version="1.0" encoding="utf-8"?>
+<file path=customXml/item2.xml><?xml version="1.0" encoding="utf-8"?>
 <p:properties xmlns:p="http://schemas.microsoft.com/office/2006/metadata/properties" xmlns:xsi="http://www.w3.org/2001/XMLSchema-instance" xmlns:pc="http://schemas.microsoft.com/office/infopath/2007/PartnerControls">
   <documentManagement>
     <PublishingExpirationDate xmlns="http://schemas.microsoft.com/sharepoint/v3" xsi:nil="true"/>
@@ -26377,15 +26590,16 @@
 </p:properties>
 </file>
 
-<file path=customXml/itemProps1.xml><?xml version="1.0" encoding="utf-8"?>
-<ds:datastoreItem xmlns:ds="http://schemas.openxmlformats.org/officeDocument/2006/customXml" ds:itemID="{7A22D130-614C-431C-BC34-0A693743B793}">
-  <ds:schemaRefs>
-    <ds:schemaRef ds:uri="http://schemas.microsoft.com/sharepoint/v3/contenttype/forms"/>
-  </ds:schemaRefs>
-</ds:datastoreItem>
+<file path=customXml/item3.xml><?xml version="1.0" encoding="utf-8"?>
+<?mso-contentType ?>
+<FormTemplates xmlns="http://schemas.microsoft.com/sharepoint/v3/contenttype/forms">
+  <Display>DocumentLibraryForm</Display>
+  <Edit>DocumentLibraryForm</Edit>
+  <New>DocumentLibraryForm</New>
+</FormTemplates>
 </file>
 
-<file path=customXml/itemProps2.xml><?xml version="1.0" encoding="utf-8"?>
+<file path=customXml/itemProps1.xml><?xml version="1.0" encoding="utf-8"?>
 <ds:datastoreItem xmlns:ds="http://schemas.openxmlformats.org/officeDocument/2006/customXml" ds:itemID="{D505B3AB-DE03-4E70-A7AB-24562E2EA8E1}">
   <ds:schemaRefs>
     <ds:schemaRef ds:uri="http://schemas.microsoft.com/office/2006/metadata/contentType"/>
@@ -26405,20 +26619,28 @@
 </ds:datastoreItem>
 </file>
 
-<file path=customXml/itemProps3.xml><?xml version="1.0" encoding="utf-8"?>
+<file path=customXml/itemProps2.xml><?xml version="1.0" encoding="utf-8"?>
 <ds:datastoreItem xmlns:ds="http://schemas.openxmlformats.org/officeDocument/2006/customXml" ds:itemID="{34AB0903-C811-4386-89A0-517F35E2B28C}">
   <ds:schemaRefs>
+    <ds:schemaRef ds:uri="fdaf2857-34a0-4271-9efd-53feeda81814"/>
+    <ds:schemaRef ds:uri="http://purl.org/dc/dcmitype/"/>
+    <ds:schemaRef ds:uri="http://purl.org/dc/terms/"/>
     <ds:schemaRef ds:uri="http://www.w3.org/XML/1998/namespace"/>
     <ds:schemaRef ds:uri="http://purl.org/dc/elements/1.1/"/>
+    <ds:schemaRef ds:uri="http://schemas.microsoft.com/office/2006/documentManagement/types"/>
+    <ds:schemaRef ds:uri="http://schemas.microsoft.com/office/infopath/2007/PartnerControls"/>
     <ds:schemaRef ds:uri="http://schemas.microsoft.com/sharepoint/v3"/>
+    <ds:schemaRef ds:uri="http://schemas.openxmlformats.org/package/2006/metadata/core-properties"/>
     <ds:schemaRef ds:uri="eaa6d935-851e-4683-8fb3-4830ef9470e6"/>
-    <ds:schemaRef ds:uri="http://purl.org/dc/terms/"/>
-    <ds:schemaRef ds:uri="http://schemas.openxmlformats.org/package/2006/metadata/core-properties"/>
-    <ds:schemaRef ds:uri="http://schemas.microsoft.com/office/2006/documentManagement/types"/>
     <ds:schemaRef ds:uri="http://schemas.microsoft.com/office/2006/metadata/properties"/>
-    <ds:schemaRef ds:uri="http://schemas.microsoft.com/office/infopath/2007/PartnerControls"/>
-    <ds:schemaRef ds:uri="fdaf2857-34a0-4271-9efd-53feeda81814"/>
-    <ds:schemaRef ds:uri="http://purl.org/dc/dcmitype/"/>
+  </ds:schemaRefs>
+</ds:datastoreItem>
+</file>
+
+<file path=customXml/itemProps3.xml><?xml version="1.0" encoding="utf-8"?>
+<ds:datastoreItem xmlns:ds="http://schemas.openxmlformats.org/officeDocument/2006/customXml" ds:itemID="{7A22D130-614C-431C-BC34-0A693743B793}">
+  <ds:schemaRefs>
+    <ds:schemaRef ds:uri="http://schemas.microsoft.com/sharepoint/v3/contenttype/forms"/>
   </ds:schemaRefs>
 </ds:datastoreItem>
 </file>
</xml_diff>

<commit_message>
Removed borders from the map of zips
</commit_message>
<xml_diff>
--- a/2_Processing/NYC Psychotherapists.pptx
+++ b/2_Processing/NYC Psychotherapists.pptx
@@ -22639,15 +22639,7 @@
           <a:p>
             <a:r>
               <a:rPr lang="en-US" dirty="0" smtClean="0"/>
-              <a:t>Visualization </a:t>
-            </a:r>
-            <a:r>
-              <a:rPr lang="en-US" dirty="0" smtClean="0"/>
-              <a:t>of “therapist density” in NYC by </a:t>
-            </a:r>
-            <a:r>
-              <a:rPr lang="en-US" dirty="0" smtClean="0"/>
-              <a:t>zip code</a:t>
+              <a:t>Visualization of “therapist density” in NYC by zip code</a:t>
             </a:r>
             <a:endParaRPr lang="en-US" dirty="0"/>
           </a:p>
@@ -22672,9 +22664,254 @@
           </a:p>
         </p:txBody>
       </p:sp>
+      <p:sp>
+        <p:nvSpPr>
+          <p:cNvPr id="7" name="Content Placeholder 2"/>
+          <p:cNvSpPr txBox="1">
+            <a:spLocks/>
+          </p:cNvSpPr>
+          <p:nvPr/>
+        </p:nvSpPr>
+        <p:spPr bwMode="gray">
+          <a:xfrm>
+            <a:off x="6781800" y="2190750"/>
+            <a:ext cx="1962150" cy="990600"/>
+          </a:xfrm>
+          <a:prstGeom prst="rect">
+            <a:avLst/>
+          </a:prstGeom>
+        </p:spPr>
+        <p:txBody>
+          <a:bodyPr vert="horz" lIns="0" tIns="18000" rIns="0" bIns="0" rtlCol="0" anchor="t" anchorCtr="0">
+            <a:noAutofit/>
+          </a:bodyPr>
+          <a:lstStyle>
+            <a:lvl1pPr marL="0" marR="0" indent="0" algn="l" defTabSz="914400" rtl="0" eaLnBrk="1" fontAlgn="auto" latinLnBrk="0" hangingPunct="1">
+              <a:lnSpc>
+                <a:spcPct val="100000"/>
+              </a:lnSpc>
+              <a:spcBef>
+                <a:spcPts val="600"/>
+              </a:spcBef>
+              <a:spcAft>
+                <a:spcPts val="0"/>
+              </a:spcAft>
+              <a:buClrTx/>
+              <a:buSzTx/>
+              <a:buFont typeface="Arial" pitchFamily="34" charset="0"/>
+              <a:buNone/>
+              <a:tabLst/>
+              <a:defRPr sz="1800" kern="1200">
+                <a:solidFill>
+                  <a:schemeClr val="tx2"/>
+                </a:solidFill>
+                <a:latin typeface="Arial" pitchFamily="34" charset="0"/>
+                <a:ea typeface="+mn-ea"/>
+                <a:cs typeface="Arial" pitchFamily="34" charset="0"/>
+              </a:defRPr>
+            </a:lvl1pPr>
+            <a:lvl2pPr marL="0" marR="0" indent="0" algn="l" defTabSz="914400" rtl="0" eaLnBrk="1" fontAlgn="auto" latinLnBrk="0" hangingPunct="1">
+              <a:lnSpc>
+                <a:spcPct val="100000"/>
+              </a:lnSpc>
+              <a:spcBef>
+                <a:spcPts val="600"/>
+              </a:spcBef>
+              <a:spcAft>
+                <a:spcPts val="0"/>
+              </a:spcAft>
+              <a:buClrTx/>
+              <a:buSzTx/>
+              <a:buFont typeface="Arial" pitchFamily="34" charset="0"/>
+              <a:buNone/>
+              <a:tabLst/>
+              <a:defRPr sz="1600" kern="1200">
+                <a:solidFill>
+                  <a:schemeClr val="tx1"/>
+                </a:solidFill>
+                <a:latin typeface="Arial" pitchFamily="34" charset="0"/>
+                <a:ea typeface="+mn-ea"/>
+                <a:cs typeface="Arial" pitchFamily="34" charset="0"/>
+              </a:defRPr>
+            </a:lvl2pPr>
+            <a:lvl3pPr marL="180975" marR="0" indent="-180975" algn="l" defTabSz="914400" rtl="0" eaLnBrk="1" fontAlgn="auto" latinLnBrk="0" hangingPunct="1">
+              <a:lnSpc>
+                <a:spcPct val="100000"/>
+              </a:lnSpc>
+              <a:spcBef>
+                <a:spcPts val="300"/>
+              </a:spcBef>
+              <a:spcAft>
+                <a:spcPts val="0"/>
+              </a:spcAft>
+              <a:buClrTx/>
+              <a:buSzTx/>
+              <a:buFont typeface="Arial" pitchFamily="34" charset="0"/>
+              <a:buChar char="•"/>
+              <a:tabLst/>
+              <a:defRPr sz="1600" kern="1200">
+                <a:solidFill>
+                  <a:schemeClr val="tx1"/>
+                </a:solidFill>
+                <a:latin typeface="Arial" pitchFamily="34" charset="0"/>
+                <a:ea typeface="+mn-ea"/>
+                <a:cs typeface="Arial" pitchFamily="34" charset="0"/>
+              </a:defRPr>
+            </a:lvl3pPr>
+            <a:lvl4pPr marL="360000" marR="0" indent="-180975" algn="l" defTabSz="914400" rtl="0" eaLnBrk="1" fontAlgn="auto" latinLnBrk="0" hangingPunct="1">
+              <a:lnSpc>
+                <a:spcPct val="100000"/>
+              </a:lnSpc>
+              <a:spcBef>
+                <a:spcPts val="300"/>
+              </a:spcBef>
+              <a:spcAft>
+                <a:spcPts val="0"/>
+              </a:spcAft>
+              <a:buClrTx/>
+              <a:buSzTx/>
+              <a:buFont typeface="Arial" pitchFamily="34" charset="0"/>
+              <a:buChar char="•"/>
+              <a:tabLst/>
+              <a:defRPr sz="1600" kern="1200">
+                <a:solidFill>
+                  <a:schemeClr val="tx1"/>
+                </a:solidFill>
+                <a:latin typeface="Arial" pitchFamily="34" charset="0"/>
+                <a:ea typeface="+mn-ea"/>
+                <a:cs typeface="Arial" pitchFamily="34" charset="0"/>
+              </a:defRPr>
+            </a:lvl4pPr>
+            <a:lvl5pPr marL="540000" marR="0" indent="-180975" algn="l" defTabSz="914400" rtl="0" eaLnBrk="1" fontAlgn="auto" latinLnBrk="0" hangingPunct="1">
+              <a:lnSpc>
+                <a:spcPct val="100000"/>
+              </a:lnSpc>
+              <a:spcBef>
+                <a:spcPts val="300"/>
+              </a:spcBef>
+              <a:spcAft>
+                <a:spcPts val="0"/>
+              </a:spcAft>
+              <a:buClrTx/>
+              <a:buSzTx/>
+              <a:buFont typeface="Arial" pitchFamily="34" charset="0"/>
+              <a:buChar char="•"/>
+              <a:tabLst/>
+              <a:defRPr sz="1600" kern="1200">
+                <a:solidFill>
+                  <a:schemeClr val="tx1"/>
+                </a:solidFill>
+                <a:latin typeface="Arial" pitchFamily="34" charset="0"/>
+                <a:ea typeface="+mn-ea"/>
+                <a:cs typeface="Arial" pitchFamily="34" charset="0"/>
+              </a:defRPr>
+            </a:lvl5pPr>
+            <a:lvl6pPr marL="540000" marR="0" indent="-180975" algn="l" defTabSz="914400" rtl="0" eaLnBrk="1" fontAlgn="auto" latinLnBrk="0" hangingPunct="1">
+              <a:lnSpc>
+                <a:spcPct val="100000"/>
+              </a:lnSpc>
+              <a:spcBef>
+                <a:spcPts val="300"/>
+              </a:spcBef>
+              <a:spcAft>
+                <a:spcPts val="0"/>
+              </a:spcAft>
+              <a:buClrTx/>
+              <a:buSzTx/>
+              <a:buFont typeface="Arial" pitchFamily="34" charset="0"/>
+              <a:buChar char="•"/>
+              <a:tabLst/>
+              <a:defRPr sz="1600" kern="1200">
+                <a:solidFill>
+                  <a:schemeClr val="tx1"/>
+                </a:solidFill>
+                <a:latin typeface="Arial" pitchFamily="34" charset="0"/>
+                <a:ea typeface="+mn-ea"/>
+                <a:cs typeface="Arial" pitchFamily="34" charset="0"/>
+              </a:defRPr>
+            </a:lvl6pPr>
+            <a:lvl7pPr marL="540000" marR="0" indent="-180975" algn="l" defTabSz="914400" rtl="0" eaLnBrk="1" fontAlgn="auto" latinLnBrk="0" hangingPunct="1">
+              <a:lnSpc>
+                <a:spcPct val="100000"/>
+              </a:lnSpc>
+              <a:spcBef>
+                <a:spcPts val="300"/>
+              </a:spcBef>
+              <a:spcAft>
+                <a:spcPts val="0"/>
+              </a:spcAft>
+              <a:buClrTx/>
+              <a:buSzTx/>
+              <a:buFont typeface="Arial" pitchFamily="34" charset="0"/>
+              <a:buChar char="•"/>
+              <a:tabLst/>
+              <a:defRPr sz="1600" kern="1200">
+                <a:solidFill>
+                  <a:schemeClr val="tx1"/>
+                </a:solidFill>
+                <a:latin typeface="Arial" pitchFamily="34" charset="0"/>
+                <a:ea typeface="+mn-ea"/>
+                <a:cs typeface="Arial" pitchFamily="34" charset="0"/>
+              </a:defRPr>
+            </a:lvl7pPr>
+            <a:lvl8pPr marL="540000" indent="-180000" algn="l" defTabSz="914400" rtl="0" eaLnBrk="1" latinLnBrk="0" hangingPunct="1">
+              <a:spcBef>
+                <a:spcPts val="300"/>
+              </a:spcBef>
+              <a:spcAft>
+                <a:spcPts val="0"/>
+              </a:spcAft>
+              <a:buFont typeface="Arial" pitchFamily="34" charset="0"/>
+              <a:buChar char="•"/>
+              <a:defRPr sz="1600" kern="1200">
+                <a:solidFill>
+                  <a:schemeClr val="tx1"/>
+                </a:solidFill>
+                <a:latin typeface="Arial" pitchFamily="34" charset="0"/>
+                <a:ea typeface="+mn-ea"/>
+                <a:cs typeface="Arial" pitchFamily="34" charset="0"/>
+              </a:defRPr>
+            </a:lvl8pPr>
+            <a:lvl9pPr marL="540000" marR="0" indent="-180975" algn="l" defTabSz="914400" rtl="0" eaLnBrk="1" fontAlgn="auto" latinLnBrk="0" hangingPunct="1">
+              <a:lnSpc>
+                <a:spcPct val="100000"/>
+              </a:lnSpc>
+              <a:spcBef>
+                <a:spcPts val="300"/>
+              </a:spcBef>
+              <a:spcAft>
+                <a:spcPts val="0"/>
+              </a:spcAft>
+              <a:buClrTx/>
+              <a:buSzTx/>
+              <a:buFont typeface="Arial" pitchFamily="34" charset="0"/>
+              <a:buChar char="•"/>
+              <a:tabLst/>
+              <a:defRPr sz="1600" kern="1200">
+                <a:solidFill>
+                  <a:schemeClr val="tx1"/>
+                </a:solidFill>
+                <a:latin typeface="Arial" pitchFamily="34" charset="0"/>
+                <a:ea typeface="+mn-ea"/>
+                <a:cs typeface="Arial" pitchFamily="34" charset="0"/>
+              </a:defRPr>
+            </a:lvl9pPr>
+          </a:lstStyle>
+          <a:p>
+            <a:pPr marL="285750" indent="-285750">
+              <a:buFont typeface="Arial" pitchFamily="34" charset="0"/>
+              <a:buChar char="•"/>
+            </a:pPr>
+            <a:r>
+              <a:rPr lang="en-US" sz="1400" dirty="0" smtClean="0"/>
+              <a:t>“Density” = number of therapists per 1000 households</a:t>
+            </a:r>
+          </a:p>
+        </p:txBody>
+      </p:sp>
       <p:pic>
         <p:nvPicPr>
-          <p:cNvPr id="6" name="Picture 5"/>
+          <p:cNvPr id="5" name="Picture 4"/>
           <p:cNvPicPr>
             <a:picLocks noChangeAspect="1"/>
           </p:cNvPicPr>
@@ -22694,264 +22931,14 @@
         </p:blipFill>
         <p:spPr>
           <a:xfrm>
-            <a:off x="304799" y="1047750"/>
-            <a:ext cx="7167741" cy="3895223"/>
+            <a:off x="127379" y="971550"/>
+            <a:ext cx="6551107" cy="3984434"/>
           </a:xfrm>
           <a:prstGeom prst="rect">
             <a:avLst/>
           </a:prstGeom>
         </p:spPr>
       </p:pic>
-      <p:sp>
-        <p:nvSpPr>
-          <p:cNvPr id="7" name="Content Placeholder 2"/>
-          <p:cNvSpPr txBox="1">
-            <a:spLocks/>
-          </p:cNvSpPr>
-          <p:nvPr/>
-        </p:nvSpPr>
-        <p:spPr bwMode="gray">
-          <a:xfrm>
-            <a:off x="7467600" y="2266950"/>
-            <a:ext cx="1295400" cy="1143000"/>
-          </a:xfrm>
-          <a:prstGeom prst="rect">
-            <a:avLst/>
-          </a:prstGeom>
-        </p:spPr>
-        <p:txBody>
-          <a:bodyPr vert="horz" lIns="0" tIns="18000" rIns="0" bIns="0" rtlCol="0" anchor="t" anchorCtr="0">
-            <a:noAutofit/>
-          </a:bodyPr>
-          <a:lstStyle>
-            <a:lvl1pPr marL="0" marR="0" indent="0" algn="l" defTabSz="914400" rtl="0" eaLnBrk="1" fontAlgn="auto" latinLnBrk="0" hangingPunct="1">
-              <a:lnSpc>
-                <a:spcPct val="100000"/>
-              </a:lnSpc>
-              <a:spcBef>
-                <a:spcPts val="600"/>
-              </a:spcBef>
-              <a:spcAft>
-                <a:spcPts val="0"/>
-              </a:spcAft>
-              <a:buClrTx/>
-              <a:buSzTx/>
-              <a:buFont typeface="Arial" pitchFamily="34" charset="0"/>
-              <a:buNone/>
-              <a:tabLst/>
-              <a:defRPr sz="1800" kern="1200">
-                <a:solidFill>
-                  <a:schemeClr val="tx2"/>
-                </a:solidFill>
-                <a:latin typeface="Arial" pitchFamily="34" charset="0"/>
-                <a:ea typeface="+mn-ea"/>
-                <a:cs typeface="Arial" pitchFamily="34" charset="0"/>
-              </a:defRPr>
-            </a:lvl1pPr>
-            <a:lvl2pPr marL="0" marR="0" indent="0" algn="l" defTabSz="914400" rtl="0" eaLnBrk="1" fontAlgn="auto" latinLnBrk="0" hangingPunct="1">
-              <a:lnSpc>
-                <a:spcPct val="100000"/>
-              </a:lnSpc>
-              <a:spcBef>
-                <a:spcPts val="600"/>
-              </a:spcBef>
-              <a:spcAft>
-                <a:spcPts val="0"/>
-              </a:spcAft>
-              <a:buClrTx/>
-              <a:buSzTx/>
-              <a:buFont typeface="Arial" pitchFamily="34" charset="0"/>
-              <a:buNone/>
-              <a:tabLst/>
-              <a:defRPr sz="1600" kern="1200">
-                <a:solidFill>
-                  <a:schemeClr val="tx1"/>
-                </a:solidFill>
-                <a:latin typeface="Arial" pitchFamily="34" charset="0"/>
-                <a:ea typeface="+mn-ea"/>
-                <a:cs typeface="Arial" pitchFamily="34" charset="0"/>
-              </a:defRPr>
-            </a:lvl2pPr>
-            <a:lvl3pPr marL="180975" marR="0" indent="-180975" algn="l" defTabSz="914400" rtl="0" eaLnBrk="1" fontAlgn="auto" latinLnBrk="0" hangingPunct="1">
-              <a:lnSpc>
-                <a:spcPct val="100000"/>
-              </a:lnSpc>
-              <a:spcBef>
-                <a:spcPts val="300"/>
-              </a:spcBef>
-              <a:spcAft>
-                <a:spcPts val="0"/>
-              </a:spcAft>
-              <a:buClrTx/>
-              <a:buSzTx/>
-              <a:buFont typeface="Arial" pitchFamily="34" charset="0"/>
-              <a:buChar char="•"/>
-              <a:tabLst/>
-              <a:defRPr sz="1600" kern="1200">
-                <a:solidFill>
-                  <a:schemeClr val="tx1"/>
-                </a:solidFill>
-                <a:latin typeface="Arial" pitchFamily="34" charset="0"/>
-                <a:ea typeface="+mn-ea"/>
-                <a:cs typeface="Arial" pitchFamily="34" charset="0"/>
-              </a:defRPr>
-            </a:lvl3pPr>
-            <a:lvl4pPr marL="360000" marR="0" indent="-180975" algn="l" defTabSz="914400" rtl="0" eaLnBrk="1" fontAlgn="auto" latinLnBrk="0" hangingPunct="1">
-              <a:lnSpc>
-                <a:spcPct val="100000"/>
-              </a:lnSpc>
-              <a:spcBef>
-                <a:spcPts val="300"/>
-              </a:spcBef>
-              <a:spcAft>
-                <a:spcPts val="0"/>
-              </a:spcAft>
-              <a:buClrTx/>
-              <a:buSzTx/>
-              <a:buFont typeface="Arial" pitchFamily="34" charset="0"/>
-              <a:buChar char="•"/>
-              <a:tabLst/>
-              <a:defRPr sz="1600" kern="1200">
-                <a:solidFill>
-                  <a:schemeClr val="tx1"/>
-                </a:solidFill>
-                <a:latin typeface="Arial" pitchFamily="34" charset="0"/>
-                <a:ea typeface="+mn-ea"/>
-                <a:cs typeface="Arial" pitchFamily="34" charset="0"/>
-              </a:defRPr>
-            </a:lvl4pPr>
-            <a:lvl5pPr marL="540000" marR="0" indent="-180975" algn="l" defTabSz="914400" rtl="0" eaLnBrk="1" fontAlgn="auto" latinLnBrk="0" hangingPunct="1">
-              <a:lnSpc>
-                <a:spcPct val="100000"/>
-              </a:lnSpc>
-              <a:spcBef>
-                <a:spcPts val="300"/>
-              </a:spcBef>
-              <a:spcAft>
-                <a:spcPts val="0"/>
-              </a:spcAft>
-              <a:buClrTx/>
-              <a:buSzTx/>
-              <a:buFont typeface="Arial" pitchFamily="34" charset="0"/>
-              <a:buChar char="•"/>
-              <a:tabLst/>
-              <a:defRPr sz="1600" kern="1200">
-                <a:solidFill>
-                  <a:schemeClr val="tx1"/>
-                </a:solidFill>
-                <a:latin typeface="Arial" pitchFamily="34" charset="0"/>
-                <a:ea typeface="+mn-ea"/>
-                <a:cs typeface="Arial" pitchFamily="34" charset="0"/>
-              </a:defRPr>
-            </a:lvl5pPr>
-            <a:lvl6pPr marL="540000" marR="0" indent="-180975" algn="l" defTabSz="914400" rtl="0" eaLnBrk="1" fontAlgn="auto" latinLnBrk="0" hangingPunct="1">
-              <a:lnSpc>
-                <a:spcPct val="100000"/>
-              </a:lnSpc>
-              <a:spcBef>
-                <a:spcPts val="300"/>
-              </a:spcBef>
-              <a:spcAft>
-                <a:spcPts val="0"/>
-              </a:spcAft>
-              <a:buClrTx/>
-              <a:buSzTx/>
-              <a:buFont typeface="Arial" pitchFamily="34" charset="0"/>
-              <a:buChar char="•"/>
-              <a:tabLst/>
-              <a:defRPr sz="1600" kern="1200">
-                <a:solidFill>
-                  <a:schemeClr val="tx1"/>
-                </a:solidFill>
-                <a:latin typeface="Arial" pitchFamily="34" charset="0"/>
-                <a:ea typeface="+mn-ea"/>
-                <a:cs typeface="Arial" pitchFamily="34" charset="0"/>
-              </a:defRPr>
-            </a:lvl6pPr>
-            <a:lvl7pPr marL="540000" marR="0" indent="-180975" algn="l" defTabSz="914400" rtl="0" eaLnBrk="1" fontAlgn="auto" latinLnBrk="0" hangingPunct="1">
-              <a:lnSpc>
-                <a:spcPct val="100000"/>
-              </a:lnSpc>
-              <a:spcBef>
-                <a:spcPts val="300"/>
-              </a:spcBef>
-              <a:spcAft>
-                <a:spcPts val="0"/>
-              </a:spcAft>
-              <a:buClrTx/>
-              <a:buSzTx/>
-              <a:buFont typeface="Arial" pitchFamily="34" charset="0"/>
-              <a:buChar char="•"/>
-              <a:tabLst/>
-              <a:defRPr sz="1600" kern="1200">
-                <a:solidFill>
-                  <a:schemeClr val="tx1"/>
-                </a:solidFill>
-                <a:latin typeface="Arial" pitchFamily="34" charset="0"/>
-                <a:ea typeface="+mn-ea"/>
-                <a:cs typeface="Arial" pitchFamily="34" charset="0"/>
-              </a:defRPr>
-            </a:lvl7pPr>
-            <a:lvl8pPr marL="540000" indent="-180000" algn="l" defTabSz="914400" rtl="0" eaLnBrk="1" latinLnBrk="0" hangingPunct="1">
-              <a:spcBef>
-                <a:spcPts val="300"/>
-              </a:spcBef>
-              <a:spcAft>
-                <a:spcPts val="0"/>
-              </a:spcAft>
-              <a:buFont typeface="Arial" pitchFamily="34" charset="0"/>
-              <a:buChar char="•"/>
-              <a:defRPr sz="1600" kern="1200">
-                <a:solidFill>
-                  <a:schemeClr val="tx1"/>
-                </a:solidFill>
-                <a:latin typeface="Arial" pitchFamily="34" charset="0"/>
-                <a:ea typeface="+mn-ea"/>
-                <a:cs typeface="Arial" pitchFamily="34" charset="0"/>
-              </a:defRPr>
-            </a:lvl8pPr>
-            <a:lvl9pPr marL="540000" marR="0" indent="-180975" algn="l" defTabSz="914400" rtl="0" eaLnBrk="1" fontAlgn="auto" latinLnBrk="0" hangingPunct="1">
-              <a:lnSpc>
-                <a:spcPct val="100000"/>
-              </a:lnSpc>
-              <a:spcBef>
-                <a:spcPts val="300"/>
-              </a:spcBef>
-              <a:spcAft>
-                <a:spcPts val="0"/>
-              </a:spcAft>
-              <a:buClrTx/>
-              <a:buSzTx/>
-              <a:buFont typeface="Arial" pitchFamily="34" charset="0"/>
-              <a:buChar char="•"/>
-              <a:tabLst/>
-              <a:defRPr sz="1600" kern="1200">
-                <a:solidFill>
-                  <a:schemeClr val="tx1"/>
-                </a:solidFill>
-                <a:latin typeface="Arial" pitchFamily="34" charset="0"/>
-                <a:ea typeface="+mn-ea"/>
-                <a:cs typeface="Arial" pitchFamily="34" charset="0"/>
-              </a:defRPr>
-            </a:lvl9pPr>
-          </a:lstStyle>
-          <a:p>
-            <a:pPr marL="285750" indent="-285750">
-              <a:buFont typeface="Arial" pitchFamily="34" charset="0"/>
-              <a:buChar char="•"/>
-            </a:pPr>
-            <a:r>
-              <a:rPr lang="en-US" sz="1400" dirty="0" smtClean="0"/>
-              <a:t>“Density” = number of therapists per 1000 </a:t>
-            </a:r>
-            <a:r>
-              <a:rPr lang="en-US" sz="1400" dirty="0" smtClean="0"/>
-              <a:t>households</a:t>
-            </a:r>
-            <a:endParaRPr lang="en-US" sz="1400" dirty="0" smtClean="0"/>
-          </a:p>
-        </p:txBody>
-      </p:sp>
     </p:spTree>
     <p:extLst>
       <p:ext uri="{BB962C8B-B14F-4D97-AF65-F5344CB8AC3E}">
@@ -26277,6 +26264,15 @@
 </file>
 
 <file path=customXml/item1.xml><?xml version="1.0" encoding="utf-8"?>
+<?mso-contentType ?>
+<FormTemplates xmlns="http://schemas.microsoft.com/sharepoint/v3/contenttype/forms">
+  <Display>DocumentLibraryForm</Display>
+  <Edit>DocumentLibraryForm</Edit>
+  <New>DocumentLibraryForm</New>
+</FormTemplates>
+</file>
+
+<file path=customXml/item2.xml><?xml version="1.0" encoding="utf-8"?>
 <ct:contentTypeSchema xmlns:ct="http://schemas.microsoft.com/office/2006/metadata/contentType" xmlns:ma="http://schemas.microsoft.com/office/2006/metadata/properties/metaAttributes" ct:_="" ma:_="" ma:contentTypeName="Document" ma:contentTypeID="0x010100D9151DFF91B0A44197B29C020F8C642F" ma:contentTypeVersion="44" ma:contentTypeDescription="Create a new document." ma:contentTypeScope="" ma:versionID="37d6c69e0f0b1eab2d91fd3d2fe12a06">
   <xsd:schema xmlns:xsd="http://www.w3.org/2001/XMLSchema" xmlns:xs="http://www.w3.org/2001/XMLSchema" xmlns:p="http://schemas.microsoft.com/office/2006/metadata/properties" xmlns:ns1="http://schemas.microsoft.com/sharepoint/v3" xmlns:ns2="fdaf2857-34a0-4271-9efd-53feeda81814" xmlns:ns3="eaa6d935-851e-4683-8fb3-4830ef9470e6" targetNamespace="http://schemas.microsoft.com/office/2006/metadata/properties" ma:root="true" ma:fieldsID="306287739f13a793c1a58b147bf45c68" ns1:_="" ns2:_="" ns3:_="">
     <xsd:import namespace="http://schemas.microsoft.com/sharepoint/v3"/>
@@ -26518,7 +26514,7 @@
 </ct:contentTypeSchema>
 </file>
 
-<file path=customXml/item2.xml><?xml version="1.0" encoding="utf-8"?>
+<file path=customXml/item3.xml><?xml version="1.0" encoding="utf-8"?>
 <p:properties xmlns:p="http://schemas.microsoft.com/office/2006/metadata/properties" xmlns:xsi="http://www.w3.org/2001/XMLSchema-instance" xmlns:pc="http://schemas.microsoft.com/office/infopath/2007/PartnerControls">
   <documentManagement>
     <PublishingExpirationDate xmlns="http://schemas.microsoft.com/sharepoint/v3" xsi:nil="true"/>
@@ -26590,16 +26586,15 @@
 </p:properties>
 </file>
 
-<file path=customXml/item3.xml><?xml version="1.0" encoding="utf-8"?>
-<?mso-contentType ?>
-<FormTemplates xmlns="http://schemas.microsoft.com/sharepoint/v3/contenttype/forms">
-  <Display>DocumentLibraryForm</Display>
-  <Edit>DocumentLibraryForm</Edit>
-  <New>DocumentLibraryForm</New>
-</FormTemplates>
+<file path=customXml/itemProps1.xml><?xml version="1.0" encoding="utf-8"?>
+<ds:datastoreItem xmlns:ds="http://schemas.openxmlformats.org/officeDocument/2006/customXml" ds:itemID="{7A22D130-614C-431C-BC34-0A693743B793}">
+  <ds:schemaRefs>
+    <ds:schemaRef ds:uri="http://schemas.microsoft.com/sharepoint/v3/contenttype/forms"/>
+  </ds:schemaRefs>
+</ds:datastoreItem>
 </file>
 
-<file path=customXml/itemProps1.xml><?xml version="1.0" encoding="utf-8"?>
+<file path=customXml/itemProps2.xml><?xml version="1.0" encoding="utf-8"?>
 <ds:datastoreItem xmlns:ds="http://schemas.openxmlformats.org/officeDocument/2006/customXml" ds:itemID="{D505B3AB-DE03-4E70-A7AB-24562E2EA8E1}">
   <ds:schemaRefs>
     <ds:schemaRef ds:uri="http://schemas.microsoft.com/office/2006/metadata/contentType"/>
@@ -26619,7 +26614,7 @@
 </ds:datastoreItem>
 </file>
 
-<file path=customXml/itemProps2.xml><?xml version="1.0" encoding="utf-8"?>
+<file path=customXml/itemProps3.xml><?xml version="1.0" encoding="utf-8"?>
 <ds:datastoreItem xmlns:ds="http://schemas.openxmlformats.org/officeDocument/2006/customXml" ds:itemID="{34AB0903-C811-4386-89A0-517F35E2B28C}">
   <ds:schemaRefs>
     <ds:schemaRef ds:uri="fdaf2857-34a0-4271-9efd-53feeda81814"/>
@@ -26635,12 +26630,4 @@
     <ds:schemaRef ds:uri="http://schemas.microsoft.com/office/2006/metadata/properties"/>
   </ds:schemaRefs>
 </ds:datastoreItem>
-</file>
-
-<file path=customXml/itemProps3.xml><?xml version="1.0" encoding="utf-8"?>
-<ds:datastoreItem xmlns:ds="http://schemas.openxmlformats.org/officeDocument/2006/customXml" ds:itemID="{7A22D130-614C-431C-BC34-0A693743B793}">
-  <ds:schemaRefs>
-    <ds:schemaRef ds:uri="http://schemas.microsoft.com/sharepoint/v3/contenttype/forms"/>
-  </ds:schemaRefs>
-</ds:datastoreItem>
 </file>
</xml_diff>